<commit_message>
I guess I forgot to commit these
</commit_message>
<xml_diff>
--- a/RAILS.pptx
+++ b/RAILS.pptx
@@ -5,7 +5,7 @@
     <p:sldMasterId id="2147483672" r:id="rId1"/>
   </p:sldMasterIdLst>
   <p:notesMasterIdLst>
-    <p:notesMasterId r:id="rId58"/>
+    <p:notesMasterId r:id="rId59"/>
   </p:notesMasterIdLst>
   <p:sldIdLst>
     <p:sldId id="256" r:id="rId2"/>
@@ -34,36 +34,37 @@
     <p:sldId id="311" r:id="rId25"/>
     <p:sldId id="312" r:id="rId26"/>
     <p:sldId id="313" r:id="rId27"/>
-    <p:sldId id="275" r:id="rId28"/>
-    <p:sldId id="276" r:id="rId29"/>
-    <p:sldId id="277" r:id="rId30"/>
-    <p:sldId id="278" r:id="rId31"/>
-    <p:sldId id="279" r:id="rId32"/>
-    <p:sldId id="280" r:id="rId33"/>
-    <p:sldId id="281" r:id="rId34"/>
-    <p:sldId id="282" r:id="rId35"/>
-    <p:sldId id="283" r:id="rId36"/>
-    <p:sldId id="284" r:id="rId37"/>
-    <p:sldId id="285" r:id="rId38"/>
-    <p:sldId id="286" r:id="rId39"/>
-    <p:sldId id="287" r:id="rId40"/>
-    <p:sldId id="288" r:id="rId41"/>
-    <p:sldId id="289" r:id="rId42"/>
-    <p:sldId id="290" r:id="rId43"/>
-    <p:sldId id="291" r:id="rId44"/>
-    <p:sldId id="292" r:id="rId45"/>
-    <p:sldId id="293" r:id="rId46"/>
-    <p:sldId id="295" r:id="rId47"/>
-    <p:sldId id="296" r:id="rId48"/>
-    <p:sldId id="297" r:id="rId49"/>
-    <p:sldId id="298" r:id="rId50"/>
-    <p:sldId id="299" r:id="rId51"/>
-    <p:sldId id="300" r:id="rId52"/>
-    <p:sldId id="301" r:id="rId53"/>
-    <p:sldId id="302" r:id="rId54"/>
-    <p:sldId id="303" r:id="rId55"/>
-    <p:sldId id="304" r:id="rId56"/>
-    <p:sldId id="305" r:id="rId57"/>
+    <p:sldId id="314" r:id="rId28"/>
+    <p:sldId id="275" r:id="rId29"/>
+    <p:sldId id="276" r:id="rId30"/>
+    <p:sldId id="277" r:id="rId31"/>
+    <p:sldId id="278" r:id="rId32"/>
+    <p:sldId id="279" r:id="rId33"/>
+    <p:sldId id="280" r:id="rId34"/>
+    <p:sldId id="281" r:id="rId35"/>
+    <p:sldId id="282" r:id="rId36"/>
+    <p:sldId id="283" r:id="rId37"/>
+    <p:sldId id="284" r:id="rId38"/>
+    <p:sldId id="285" r:id="rId39"/>
+    <p:sldId id="286" r:id="rId40"/>
+    <p:sldId id="287" r:id="rId41"/>
+    <p:sldId id="288" r:id="rId42"/>
+    <p:sldId id="289" r:id="rId43"/>
+    <p:sldId id="290" r:id="rId44"/>
+    <p:sldId id="291" r:id="rId45"/>
+    <p:sldId id="292" r:id="rId46"/>
+    <p:sldId id="293" r:id="rId47"/>
+    <p:sldId id="295" r:id="rId48"/>
+    <p:sldId id="296" r:id="rId49"/>
+    <p:sldId id="297" r:id="rId50"/>
+    <p:sldId id="298" r:id="rId51"/>
+    <p:sldId id="299" r:id="rId52"/>
+    <p:sldId id="300" r:id="rId53"/>
+    <p:sldId id="301" r:id="rId54"/>
+    <p:sldId id="302" r:id="rId55"/>
+    <p:sldId id="303" r:id="rId56"/>
+    <p:sldId id="304" r:id="rId57"/>
+    <p:sldId id="305" r:id="rId58"/>
   </p:sldIdLst>
   <p:sldSz cx="9144000" cy="6858000" type="screen4x3"/>
   <p:notesSz cx="6858000" cy="9144000"/>
@@ -162,6 +163,11 @@
       </a:defRPr>
     </a:lvl9pPr>
   </p:defaultTextStyle>
+  <p:extLst>
+    <p:ext uri="{EFAFB233-063F-42B5-8137-9DF3F51BA10A}">
+      <p15:sldGuideLst xmlns:p15="http://schemas.microsoft.com/office/powerpoint/2012/main"/>
+    </p:ext>
+  </p:extLst>
 </p:presentation>
 </file>
 
@@ -1699,30 +1705,30 @@
     </dgm:pt>
   </dgm:ptLst>
   <dgm:cxnLst>
+    <dgm:cxn modelId="{EAFE39A2-304F-9944-851A-7B71028B5A59}" type="presOf" srcId="{D0B387C8-2072-7D45-B114-AEB017D59B58}" destId="{50755954-E700-4B43-942A-C5434F22C326}" srcOrd="0" destOrd="0" presId="urn:microsoft.com/office/officeart/2005/8/layout/hierarchy1"/>
+    <dgm:cxn modelId="{9CC29CF9-B991-7943-AE21-AA33964737B6}" type="presOf" srcId="{F4887615-D87A-5D40-A304-1C7B00B8D42E}" destId="{323CF71A-0CF5-7744-A6F1-66FAF1F536DC}" srcOrd="0" destOrd="0" presId="urn:microsoft.com/office/officeart/2005/8/layout/hierarchy1"/>
+    <dgm:cxn modelId="{8FCD3118-FC82-684F-8EB6-77EBF2934CA6}" srcId="{B254A527-71E6-664E-96EC-3A8053F6EF42}" destId="{F923F962-2F83-BA47-A914-03E988B250F9}" srcOrd="0" destOrd="0" parTransId="{0EF2113D-8FC4-3549-860B-1B1F04E0BE76}" sibTransId="{3E2BED52-7325-C143-9222-E026B2949CF3}"/>
+    <dgm:cxn modelId="{5BEE8C05-FFE9-E24E-8DF9-6C1A7A5A8E27}" type="presOf" srcId="{F923F962-2F83-BA47-A914-03E988B250F9}" destId="{5D488183-5CDD-5344-808D-CD8220FCBD76}" srcOrd="0" destOrd="0" presId="urn:microsoft.com/office/officeart/2005/8/layout/hierarchy1"/>
+    <dgm:cxn modelId="{48041836-2324-E54B-8224-BE19BC4026F5}" type="presOf" srcId="{14C435FB-EAFA-9F44-9F51-A10AE75997C3}" destId="{C1D43E91-A413-DE46-A208-B2308D66A8BD}" srcOrd="0" destOrd="0" presId="urn:microsoft.com/office/officeart/2005/8/layout/hierarchy1"/>
+    <dgm:cxn modelId="{6B237974-E60A-3A42-9036-0E69934346F6}" type="presOf" srcId="{A4BE8854-4023-304E-B3EB-5AC32F1962E7}" destId="{2DF8C4D5-2F1E-004A-BF84-1D546054B891}" srcOrd="0" destOrd="0" presId="urn:microsoft.com/office/officeart/2005/8/layout/hierarchy1"/>
+    <dgm:cxn modelId="{4DF16C67-C698-5F45-9DCF-9E4F8012EB0C}" type="presOf" srcId="{114EA452-8DB8-EB40-981A-497BAB39B49C}" destId="{F6629369-1C39-BC43-9269-3E50692DE7D9}" srcOrd="0" destOrd="0" presId="urn:microsoft.com/office/officeart/2005/8/layout/hierarchy1"/>
+    <dgm:cxn modelId="{A49E5EF6-DBAE-2F43-ABCB-2C0A3120CDB0}" srcId="{3B092FB5-44B0-A64A-A030-6E8F963F6AC6}" destId="{A4BE8854-4023-304E-B3EB-5AC32F1962E7}" srcOrd="3" destOrd="0" parTransId="{5A29ACEF-2C8A-E549-8250-F23F49A1355B}" sibTransId="{2C306594-55C1-0945-B428-D12852DEAF43}"/>
+    <dgm:cxn modelId="{25F8DC77-F129-8247-A596-5B22CF43E862}" type="presOf" srcId="{709A7E05-2319-734A-B488-FE0597C4775F}" destId="{1FD22579-92B0-2549-9C8C-A73E27613932}" srcOrd="0" destOrd="0" presId="urn:microsoft.com/office/officeart/2005/8/layout/hierarchy1"/>
+    <dgm:cxn modelId="{68504995-5DD6-284A-90DD-F88DE0CBC9C4}" srcId="{E5F35591-B609-C043-A4E8-1738D6DB9677}" destId="{3B092FB5-44B0-A64A-A030-6E8F963F6AC6}" srcOrd="0" destOrd="0" parTransId="{5B6789D9-9EF3-334F-8315-A6E0A6E4D549}" sibTransId="{50619591-9D63-194E-A1DF-E0AB9053EB0E}"/>
+    <dgm:cxn modelId="{495A66E8-0DC4-4748-88CD-0CE6BF6B341F}" srcId="{3B092FB5-44B0-A64A-A030-6E8F963F6AC6}" destId="{14C435FB-EAFA-9F44-9F51-A10AE75997C3}" srcOrd="2" destOrd="0" parTransId="{709A7E05-2319-734A-B488-FE0597C4775F}" sibTransId="{FCF127D4-FA6F-064A-9508-9C9BA416CD90}"/>
+    <dgm:cxn modelId="{3B2FD74C-73F0-174A-8160-3677C4EA2DE1}" srcId="{3B092FB5-44B0-A64A-A030-6E8F963F6AC6}" destId="{0D73CD69-5DE4-7D41-9198-70F25483A37D}" srcOrd="1" destOrd="0" parTransId="{114EA452-8DB8-EB40-981A-497BAB39B49C}" sibTransId="{322046D7-B002-A64E-A8AF-BC2629005A8C}"/>
+    <dgm:cxn modelId="{4949CED7-3225-4B4C-BD91-28B994D63525}" type="presOf" srcId="{86FF425C-ACC5-4D47-9382-F60330B49F7A}" destId="{A5A49494-05FE-1547-837D-13990FCAEAA9}" srcOrd="0" destOrd="0" presId="urn:microsoft.com/office/officeart/2005/8/layout/hierarchy1"/>
+    <dgm:cxn modelId="{4777047E-1202-2940-B110-0EA9596011B9}" type="presOf" srcId="{39F573E4-7FE9-E64D-85A2-416ABEB9CD7F}" destId="{CD93AA73-DE57-CA42-9D58-EAA4FD0F23AA}" srcOrd="0" destOrd="0" presId="urn:microsoft.com/office/officeart/2005/8/layout/hierarchy1"/>
+    <dgm:cxn modelId="{175A6937-B596-4E4C-A20E-D1E5BC550A49}" type="presOf" srcId="{E5F35591-B609-C043-A4E8-1738D6DB9677}" destId="{631CEA14-BDF4-F94A-A9BE-F71E655D201A}" srcOrd="0" destOrd="0" presId="urn:microsoft.com/office/officeart/2005/8/layout/hierarchy1"/>
+    <dgm:cxn modelId="{A902676B-578D-6548-822E-A016AF759E32}" type="presOf" srcId="{5A29ACEF-2C8A-E549-8250-F23F49A1355B}" destId="{4FA1CEED-C3A9-724D-81A2-08F06B68DEC4}" srcOrd="0" destOrd="0" presId="urn:microsoft.com/office/officeart/2005/8/layout/hierarchy1"/>
+    <dgm:cxn modelId="{8AECBCD0-A566-684A-8D86-7D60810F211D}" type="presOf" srcId="{E9AC4380-D1BA-BB4D-A316-490ECBF13FA0}" destId="{A46E9823-B5D0-1A45-836A-FC65AEE3D6D3}" srcOrd="0" destOrd="0" presId="urn:microsoft.com/office/officeart/2005/8/layout/hierarchy1"/>
+    <dgm:cxn modelId="{6940A4ED-EA2B-2047-8B6B-6D91B0A70BDC}" type="presOf" srcId="{B254A527-71E6-664E-96EC-3A8053F6EF42}" destId="{3864F04F-A2F2-4441-AD33-C70E1AB2DC76}" srcOrd="0" destOrd="0" presId="urn:microsoft.com/office/officeart/2005/8/layout/hierarchy1"/>
+    <dgm:cxn modelId="{B95BF457-A933-314D-82EE-B00241D9CA9C}" srcId="{3B092FB5-44B0-A64A-A030-6E8F963F6AC6}" destId="{B254A527-71E6-664E-96EC-3A8053F6EF42}" srcOrd="0" destOrd="0" parTransId="{F4887615-D87A-5D40-A304-1C7B00B8D42E}" sibTransId="{C96BA32B-1C8D-FC4B-9DE9-96BE7C848B0F}"/>
+    <dgm:cxn modelId="{B9919E3E-FEFF-4749-BF69-E20D03990106}" type="presOf" srcId="{3B092FB5-44B0-A64A-A030-6E8F963F6AC6}" destId="{0A606942-B6B4-EA49-91C7-9DD890AD8C46}" srcOrd="0" destOrd="0" presId="urn:microsoft.com/office/officeart/2005/8/layout/hierarchy1"/>
+    <dgm:cxn modelId="{A1B47981-9C57-2D4E-B232-A98A80227CB7}" srcId="{0D73CD69-5DE4-7D41-9198-70F25483A37D}" destId="{D0B387C8-2072-7D45-B114-AEB017D59B58}" srcOrd="0" destOrd="0" parTransId="{E9AC4380-D1BA-BB4D-A316-490ECBF13FA0}" sibTransId="{92BE2C03-F10C-774D-BA99-6D93D8C62F47}"/>
     <dgm:cxn modelId="{D23AE03C-AEEA-E245-A402-C56934D9B2C8}" type="presOf" srcId="{0D73CD69-5DE4-7D41-9198-70F25483A37D}" destId="{F7E3487F-B01C-724F-A844-725290898A4E}" srcOrd="0" destOrd="0" presId="urn:microsoft.com/office/officeart/2005/8/layout/hierarchy1"/>
-    <dgm:cxn modelId="{5BEE8C05-FFE9-E24E-8DF9-6C1A7A5A8E27}" type="presOf" srcId="{F923F962-2F83-BA47-A914-03E988B250F9}" destId="{5D488183-5CDD-5344-808D-CD8220FCBD76}" srcOrd="0" destOrd="0" presId="urn:microsoft.com/office/officeart/2005/8/layout/hierarchy1"/>
-    <dgm:cxn modelId="{B9919E3E-FEFF-4749-BF69-E20D03990106}" type="presOf" srcId="{3B092FB5-44B0-A64A-A030-6E8F963F6AC6}" destId="{0A606942-B6B4-EA49-91C7-9DD890AD8C46}" srcOrd="0" destOrd="0" presId="urn:microsoft.com/office/officeart/2005/8/layout/hierarchy1"/>
-    <dgm:cxn modelId="{4DF16C67-C698-5F45-9DCF-9E4F8012EB0C}" type="presOf" srcId="{114EA452-8DB8-EB40-981A-497BAB39B49C}" destId="{F6629369-1C39-BC43-9269-3E50692DE7D9}" srcOrd="0" destOrd="0" presId="urn:microsoft.com/office/officeart/2005/8/layout/hierarchy1"/>
+    <dgm:cxn modelId="{268E0654-677D-6842-9EAF-EF3A2CCCD444}" type="presOf" srcId="{0EF2113D-8FC4-3549-860B-1B1F04E0BE76}" destId="{87FB0F0B-5222-434E-97C2-0F202F6B9F1F}" srcOrd="0" destOrd="0" presId="urn:microsoft.com/office/officeart/2005/8/layout/hierarchy1"/>
     <dgm:cxn modelId="{ACE06E29-70D8-4F45-9E61-1934C309EC42}" srcId="{A4BE8854-4023-304E-B3EB-5AC32F1962E7}" destId="{86FF425C-ACC5-4D47-9382-F60330B49F7A}" srcOrd="0" destOrd="0" parTransId="{39F573E4-7FE9-E64D-85A2-416ABEB9CD7F}" sibTransId="{0EF02799-3D15-ED46-9323-B53E60A96191}"/>
-    <dgm:cxn modelId="{8AECBCD0-A566-684A-8D86-7D60810F211D}" type="presOf" srcId="{E9AC4380-D1BA-BB4D-A316-490ECBF13FA0}" destId="{A46E9823-B5D0-1A45-836A-FC65AEE3D6D3}" srcOrd="0" destOrd="0" presId="urn:microsoft.com/office/officeart/2005/8/layout/hierarchy1"/>
-    <dgm:cxn modelId="{3B2FD74C-73F0-174A-8160-3677C4EA2DE1}" srcId="{3B092FB5-44B0-A64A-A030-6E8F963F6AC6}" destId="{0D73CD69-5DE4-7D41-9198-70F25483A37D}" srcOrd="1" destOrd="0" parTransId="{114EA452-8DB8-EB40-981A-497BAB39B49C}" sibTransId="{322046D7-B002-A64E-A8AF-BC2629005A8C}"/>
-    <dgm:cxn modelId="{25F8DC77-F129-8247-A596-5B22CF43E862}" type="presOf" srcId="{709A7E05-2319-734A-B488-FE0597C4775F}" destId="{1FD22579-92B0-2549-9C8C-A73E27613932}" srcOrd="0" destOrd="0" presId="urn:microsoft.com/office/officeart/2005/8/layout/hierarchy1"/>
-    <dgm:cxn modelId="{4949CED7-3225-4B4C-BD91-28B994D63525}" type="presOf" srcId="{86FF425C-ACC5-4D47-9382-F60330B49F7A}" destId="{A5A49494-05FE-1547-837D-13990FCAEAA9}" srcOrd="0" destOrd="0" presId="urn:microsoft.com/office/officeart/2005/8/layout/hierarchy1"/>
-    <dgm:cxn modelId="{A1B47981-9C57-2D4E-B232-A98A80227CB7}" srcId="{0D73CD69-5DE4-7D41-9198-70F25483A37D}" destId="{D0B387C8-2072-7D45-B114-AEB017D59B58}" srcOrd="0" destOrd="0" parTransId="{E9AC4380-D1BA-BB4D-A316-490ECBF13FA0}" sibTransId="{92BE2C03-F10C-774D-BA99-6D93D8C62F47}"/>
-    <dgm:cxn modelId="{A49E5EF6-DBAE-2F43-ABCB-2C0A3120CDB0}" srcId="{3B092FB5-44B0-A64A-A030-6E8F963F6AC6}" destId="{A4BE8854-4023-304E-B3EB-5AC32F1962E7}" srcOrd="3" destOrd="0" parTransId="{5A29ACEF-2C8A-E549-8250-F23F49A1355B}" sibTransId="{2C306594-55C1-0945-B428-D12852DEAF43}"/>
-    <dgm:cxn modelId="{48041836-2324-E54B-8224-BE19BC4026F5}" type="presOf" srcId="{14C435FB-EAFA-9F44-9F51-A10AE75997C3}" destId="{C1D43E91-A413-DE46-A208-B2308D66A8BD}" srcOrd="0" destOrd="0" presId="urn:microsoft.com/office/officeart/2005/8/layout/hierarchy1"/>
-    <dgm:cxn modelId="{EAFE39A2-304F-9944-851A-7B71028B5A59}" type="presOf" srcId="{D0B387C8-2072-7D45-B114-AEB017D59B58}" destId="{50755954-E700-4B43-942A-C5434F22C326}" srcOrd="0" destOrd="0" presId="urn:microsoft.com/office/officeart/2005/8/layout/hierarchy1"/>
-    <dgm:cxn modelId="{6B237974-E60A-3A42-9036-0E69934346F6}" type="presOf" srcId="{A4BE8854-4023-304E-B3EB-5AC32F1962E7}" destId="{2DF8C4D5-2F1E-004A-BF84-1D546054B891}" srcOrd="0" destOrd="0" presId="urn:microsoft.com/office/officeart/2005/8/layout/hierarchy1"/>
-    <dgm:cxn modelId="{68504995-5DD6-284A-90DD-F88DE0CBC9C4}" srcId="{E5F35591-B609-C043-A4E8-1738D6DB9677}" destId="{3B092FB5-44B0-A64A-A030-6E8F963F6AC6}" srcOrd="0" destOrd="0" parTransId="{5B6789D9-9EF3-334F-8315-A6E0A6E4D549}" sibTransId="{50619591-9D63-194E-A1DF-E0AB9053EB0E}"/>
-    <dgm:cxn modelId="{4777047E-1202-2940-B110-0EA9596011B9}" type="presOf" srcId="{39F573E4-7FE9-E64D-85A2-416ABEB9CD7F}" destId="{CD93AA73-DE57-CA42-9D58-EAA4FD0F23AA}" srcOrd="0" destOrd="0" presId="urn:microsoft.com/office/officeart/2005/8/layout/hierarchy1"/>
-    <dgm:cxn modelId="{268E0654-677D-6842-9EAF-EF3A2CCCD444}" type="presOf" srcId="{0EF2113D-8FC4-3549-860B-1B1F04E0BE76}" destId="{87FB0F0B-5222-434E-97C2-0F202F6B9F1F}" srcOrd="0" destOrd="0" presId="urn:microsoft.com/office/officeart/2005/8/layout/hierarchy1"/>
-    <dgm:cxn modelId="{6940A4ED-EA2B-2047-8B6B-6D91B0A70BDC}" type="presOf" srcId="{B254A527-71E6-664E-96EC-3A8053F6EF42}" destId="{3864F04F-A2F2-4441-AD33-C70E1AB2DC76}" srcOrd="0" destOrd="0" presId="urn:microsoft.com/office/officeart/2005/8/layout/hierarchy1"/>
-    <dgm:cxn modelId="{8FCD3118-FC82-684F-8EB6-77EBF2934CA6}" srcId="{B254A527-71E6-664E-96EC-3A8053F6EF42}" destId="{F923F962-2F83-BA47-A914-03E988B250F9}" srcOrd="0" destOrd="0" parTransId="{0EF2113D-8FC4-3549-860B-1B1F04E0BE76}" sibTransId="{3E2BED52-7325-C143-9222-E026B2949CF3}"/>
-    <dgm:cxn modelId="{B95BF457-A933-314D-82EE-B00241D9CA9C}" srcId="{3B092FB5-44B0-A64A-A030-6E8F963F6AC6}" destId="{B254A527-71E6-664E-96EC-3A8053F6EF42}" srcOrd="0" destOrd="0" parTransId="{F4887615-D87A-5D40-A304-1C7B00B8D42E}" sibTransId="{C96BA32B-1C8D-FC4B-9DE9-96BE7C848B0F}"/>
-    <dgm:cxn modelId="{A902676B-578D-6548-822E-A016AF759E32}" type="presOf" srcId="{5A29ACEF-2C8A-E549-8250-F23F49A1355B}" destId="{4FA1CEED-C3A9-724D-81A2-08F06B68DEC4}" srcOrd="0" destOrd="0" presId="urn:microsoft.com/office/officeart/2005/8/layout/hierarchy1"/>
-    <dgm:cxn modelId="{175A6937-B596-4E4C-A20E-D1E5BC550A49}" type="presOf" srcId="{E5F35591-B609-C043-A4E8-1738D6DB9677}" destId="{631CEA14-BDF4-F94A-A9BE-F71E655D201A}" srcOrd="0" destOrd="0" presId="urn:microsoft.com/office/officeart/2005/8/layout/hierarchy1"/>
-    <dgm:cxn modelId="{495A66E8-0DC4-4748-88CD-0CE6BF6B341F}" srcId="{3B092FB5-44B0-A64A-A030-6E8F963F6AC6}" destId="{14C435FB-EAFA-9F44-9F51-A10AE75997C3}" srcOrd="2" destOrd="0" parTransId="{709A7E05-2319-734A-B488-FE0597C4775F}" sibTransId="{FCF127D4-FA6F-064A-9508-9C9BA416CD90}"/>
-    <dgm:cxn modelId="{9CC29CF9-B991-7943-AE21-AA33964737B6}" type="presOf" srcId="{F4887615-D87A-5D40-A304-1C7B00B8D42E}" destId="{323CF71A-0CF5-7744-A6F1-66FAF1F536DC}" srcOrd="0" destOrd="0" presId="urn:microsoft.com/office/officeart/2005/8/layout/hierarchy1"/>
     <dgm:cxn modelId="{6F684E2E-FDA9-9C48-8458-352CAB7D48E4}" type="presParOf" srcId="{631CEA14-BDF4-F94A-A9BE-F71E655D201A}" destId="{62DDD246-5D7F-5948-A621-21A1B5F2F957}" srcOrd="0" destOrd="0" presId="urn:microsoft.com/office/officeart/2005/8/layout/hierarchy1"/>
     <dgm:cxn modelId="{1AAA5336-28FD-294C-8CE9-EE1CACF88E8D}" type="presParOf" srcId="{62DDD246-5D7F-5948-A621-21A1B5F2F957}" destId="{1B1118FC-F455-8F4C-8B60-EAD7569C3943}" srcOrd="0" destOrd="0" presId="urn:microsoft.com/office/officeart/2005/8/layout/hierarchy1"/>
     <dgm:cxn modelId="{4301482B-24DB-8F44-9011-E1C0B0221FAB}" type="presParOf" srcId="{1B1118FC-F455-8F4C-8B60-EAD7569C3943}" destId="{AB2D1CAB-1721-744F-82B9-9F4C2FA7105E}" srcOrd="0" destOrd="0" presId="urn:microsoft.com/office/officeart/2005/8/layout/hierarchy1"/>
@@ -5356,7 +5362,7 @@
           <a:p>
             <a:fld id="{9E9E18E5-378B-1A47-85FE-6E5A5470C3F5}" type="datetimeFigureOut">
               <a:rPr lang="en-US" smtClean="0"/>
-              <a:t>4/10/18</a:t>
+              <a:t>4/12/18</a:t>
             </a:fld>
             <a:endParaRPr lang="en-US"/>
           </a:p>
@@ -5942,7 +5948,7 @@
           <a:p>
             <a:fld id="{1AC08193-07A0-6A48-B397-05E36DFB20CF}" type="datetimeFigureOut">
               <a:rPr lang="en-US" smtClean="0"/>
-              <a:t>4/9/18</a:t>
+              <a:t>4/12/18</a:t>
             </a:fld>
             <a:endParaRPr lang="en-US"/>
           </a:p>
@@ -6145,7 +6151,7 @@
           <a:p>
             <a:fld id="{1AC08193-07A0-6A48-B397-05E36DFB20CF}" type="datetimeFigureOut">
               <a:rPr lang="en-US" smtClean="0"/>
-              <a:t>4/9/18</a:t>
+              <a:t>4/12/18</a:t>
             </a:fld>
             <a:endParaRPr lang="en-US"/>
           </a:p>
@@ -6396,7 +6402,7 @@
           <a:p>
             <a:fld id="{1AC08193-07A0-6A48-B397-05E36DFB20CF}" type="datetimeFigureOut">
               <a:rPr lang="en-US" smtClean="0"/>
-              <a:t>4/9/18</a:t>
+              <a:t>4/12/18</a:t>
             </a:fld>
             <a:endParaRPr lang="en-US"/>
           </a:p>
@@ -6561,7 +6567,7 @@
           <a:p>
             <a:fld id="{1AC08193-07A0-6A48-B397-05E36DFB20CF}" type="datetimeFigureOut">
               <a:rPr lang="en-US" smtClean="0"/>
-              <a:t>4/9/18</a:t>
+              <a:t>4/12/18</a:t>
             </a:fld>
             <a:endParaRPr lang="en-US"/>
           </a:p>
@@ -6899,7 +6905,7 @@
           <a:p>
             <a:fld id="{1AC08193-07A0-6A48-B397-05E36DFB20CF}" type="datetimeFigureOut">
               <a:rPr lang="en-US" smtClean="0"/>
-              <a:t>4/9/18</a:t>
+              <a:t>4/12/18</a:t>
             </a:fld>
             <a:endParaRPr lang="en-US"/>
           </a:p>
@@ -7169,7 +7175,7 @@
           <a:p>
             <a:fld id="{1AC08193-07A0-6A48-B397-05E36DFB20CF}" type="datetimeFigureOut">
               <a:rPr lang="en-US" smtClean="0"/>
-              <a:t>4/9/18</a:t>
+              <a:t>4/12/18</a:t>
             </a:fld>
             <a:endParaRPr lang="en-US"/>
           </a:p>
@@ -7543,7 +7549,7 @@
           <a:p>
             <a:fld id="{1AC08193-07A0-6A48-B397-05E36DFB20CF}" type="datetimeFigureOut">
               <a:rPr lang="en-US" smtClean="0"/>
-              <a:t>4/9/18</a:t>
+              <a:t>4/12/18</a:t>
             </a:fld>
             <a:endParaRPr lang="en-US"/>
           </a:p>
@@ -7656,7 +7662,7 @@
           <a:p>
             <a:fld id="{1AC08193-07A0-6A48-B397-05E36DFB20CF}" type="datetimeFigureOut">
               <a:rPr lang="en-US" smtClean="0"/>
-              <a:t>4/9/18</a:t>
+              <a:t>4/12/18</a:t>
             </a:fld>
             <a:endParaRPr lang="en-US"/>
           </a:p>
@@ -7822,7 +7828,7 @@
           <a:p>
             <a:fld id="{1AC08193-07A0-6A48-B397-05E36DFB20CF}" type="datetimeFigureOut">
               <a:rPr lang="en-US" smtClean="0"/>
-              <a:t>4/9/18</a:t>
+              <a:t>4/12/18</a:t>
             </a:fld>
             <a:endParaRPr lang="en-US"/>
           </a:p>
@@ -8171,7 +8177,7 @@
           <a:p>
             <a:fld id="{1AC08193-07A0-6A48-B397-05E36DFB20CF}" type="datetimeFigureOut">
               <a:rPr lang="en-US" smtClean="0"/>
-              <a:t>4/9/18</a:t>
+              <a:t>4/12/18</a:t>
             </a:fld>
             <a:endParaRPr lang="en-US"/>
           </a:p>
@@ -8545,7 +8551,7 @@
           <a:p>
             <a:fld id="{1AC08193-07A0-6A48-B397-05E36DFB20CF}" type="datetimeFigureOut">
               <a:rPr lang="en-US" smtClean="0"/>
-              <a:t>4/9/18</a:t>
+              <a:t>4/12/18</a:t>
             </a:fld>
             <a:endParaRPr lang="en-US"/>
           </a:p>
@@ -8827,7 +8833,7 @@
           <a:p>
             <a:fld id="{1AC08193-07A0-6A48-B397-05E36DFB20CF}" type="datetimeFigureOut">
               <a:rPr lang="en-US" smtClean="0"/>
-              <a:t>4/9/18</a:t>
+              <a:t>4/12/18</a:t>
             </a:fld>
             <a:endParaRPr lang="en-US"/>
           </a:p>
@@ -9372,7 +9378,6 @@
               <a:rPr lang="en-US" dirty="0"/>
               <a:t>Intermediate Python for Automation and Data Processing</a:t>
             </a:r>
-            <a:endParaRPr lang="en-US" dirty="0"/>
           </a:p>
         </p:txBody>
       </p:sp>
@@ -9428,6 +9433,13 @@
   <p:clrMapOvr>
     <a:masterClrMapping/>
   </p:clrMapOvr>
+  <p:timing>
+    <p:tnLst>
+      <p:par>
+        <p:cTn id="1" dur="indefinite" restart="never" nodeType="tmRoot"/>
+      </p:par>
+    </p:tnLst>
+  </p:timing>
 </p:sld>
 </file>
 
@@ -9529,6 +9541,13 @@
   <p:clrMapOvr>
     <a:masterClrMapping/>
   </p:clrMapOvr>
+  <p:timing>
+    <p:tnLst>
+      <p:par>
+        <p:cTn id="1" dur="indefinite" restart="never" nodeType="tmRoot"/>
+      </p:par>
+    </p:tnLst>
+  </p:timing>
 </p:sld>
 </file>
 
@@ -9633,6 +9652,13 @@
   <p:clrMapOvr>
     <a:masterClrMapping/>
   </p:clrMapOvr>
+  <p:timing>
+    <p:tnLst>
+      <p:par>
+        <p:cTn id="1" dur="indefinite" restart="never" nodeType="tmRoot"/>
+      </p:par>
+    </p:tnLst>
+  </p:timing>
 </p:sld>
 </file>
 
@@ -9705,6 +9731,13 @@
   <p:clrMapOvr>
     <a:masterClrMapping/>
   </p:clrMapOvr>
+  <p:timing>
+    <p:tnLst>
+      <p:par>
+        <p:cTn id="1" dur="indefinite" restart="never" nodeType="tmRoot"/>
+      </p:par>
+    </p:tnLst>
+  </p:timing>
 </p:sld>
 </file>
 
@@ -9777,6 +9810,13 @@
   <p:clrMapOvr>
     <a:masterClrMapping/>
   </p:clrMapOvr>
+  <p:timing>
+    <p:tnLst>
+      <p:par>
+        <p:cTn id="1" dur="indefinite" restart="never" nodeType="tmRoot"/>
+      </p:par>
+    </p:tnLst>
+  </p:timing>
 </p:sld>
 </file>
 
@@ -10684,6 +10724,13 @@
   <p:clrMapOvr>
     <a:masterClrMapping/>
   </p:clrMapOvr>
+  <p:timing>
+    <p:tnLst>
+      <p:par>
+        <p:cTn id="1" dur="indefinite" restart="never" nodeType="tmRoot"/>
+      </p:par>
+    </p:tnLst>
+  </p:timing>
 </p:sld>
 </file>
 
@@ -16512,7 +16559,7 @@
       </p:grpSpPr>
       <p:sp>
         <p:nvSpPr>
-          <p:cNvPr id="4" name="Title 3"/>
+          <p:cNvPr id="2" name="Title 1"/>
           <p:cNvSpPr>
             <a:spLocks noGrp="1"/>
           </p:cNvSpPr>
@@ -16527,7 +16574,7 @@
           <a:p>
             <a:r>
               <a:rPr lang="en-US" dirty="0" smtClean="0"/>
-              <a:t>Reading &amp; Writing files</a:t>
+              <a:t>File naming activity!</a:t>
             </a:r>
             <a:endParaRPr lang="en-US" dirty="0"/>
           </a:p>
@@ -16535,12 +16582,12 @@
       </p:sp>
       <p:sp>
         <p:nvSpPr>
-          <p:cNvPr id="5" name="Text Placeholder 4"/>
+          <p:cNvPr id="3" name="Content Placeholder 2"/>
           <p:cNvSpPr>
             <a:spLocks noGrp="1"/>
           </p:cNvSpPr>
           <p:nvPr>
-            <p:ph type="body" idx="1"/>
+            <p:ph idx="1"/>
           </p:nvPr>
         </p:nvSpPr>
         <p:spPr/>
@@ -16548,14 +16595,14 @@
           <a:bodyPr/>
           <a:lstStyle/>
           <a:p>
-            <a:endParaRPr lang="en-US"/>
+            <a:endParaRPr lang="en-US" dirty="0"/>
           </a:p>
         </p:txBody>
       </p:sp>
     </p:spTree>
     <p:extLst>
       <p:ext uri="{BB962C8B-B14F-4D97-AF65-F5344CB8AC3E}">
-        <p14:creationId xmlns:p14="http://schemas.microsoft.com/office/powerpoint/2010/main" val="545332406"/>
+        <p14:creationId xmlns:p14="http://schemas.microsoft.com/office/powerpoint/2010/main" val="1647460186"/>
       </p:ext>
     </p:extLst>
   </p:cSld>
@@ -16584,7 +16631,7 @@
       </p:grpSpPr>
       <p:sp>
         <p:nvSpPr>
-          <p:cNvPr id="2" name="Title 1"/>
+          <p:cNvPr id="4" name="Title 3"/>
           <p:cNvSpPr>
             <a:spLocks noGrp="1"/>
           </p:cNvSpPr>
@@ -16599,7 +16646,7 @@
           <a:p>
             <a:r>
               <a:rPr lang="en-US" dirty="0" smtClean="0"/>
-              <a:t>Break!</a:t>
+              <a:t>Reading &amp; Writing files</a:t>
             </a:r>
             <a:endParaRPr lang="en-US" dirty="0"/>
           </a:p>
@@ -16607,7 +16654,7 @@
       </p:sp>
       <p:sp>
         <p:nvSpPr>
-          <p:cNvPr id="3" name="Text Placeholder 2"/>
+          <p:cNvPr id="5" name="Text Placeholder 4"/>
           <p:cNvSpPr>
             <a:spLocks noGrp="1"/>
           </p:cNvSpPr>
@@ -16627,7 +16674,7 @@
     </p:spTree>
     <p:extLst>
       <p:ext uri="{BB962C8B-B14F-4D97-AF65-F5344CB8AC3E}">
-        <p14:creationId xmlns:p14="http://schemas.microsoft.com/office/powerpoint/2010/main" val="356478586"/>
+        <p14:creationId xmlns:p14="http://schemas.microsoft.com/office/powerpoint/2010/main" val="545332406"/>
       </p:ext>
     </p:extLst>
   </p:cSld>
@@ -16671,7 +16718,7 @@
           <a:p>
             <a:r>
               <a:rPr lang="en-US" dirty="0" smtClean="0"/>
-              <a:t>APIs and URL endpoints</a:t>
+              <a:t>Break!</a:t>
             </a:r>
             <a:endParaRPr lang="en-US" dirty="0"/>
           </a:p>
@@ -16699,7 +16746,7 @@
     </p:spTree>
     <p:extLst>
       <p:ext uri="{BB962C8B-B14F-4D97-AF65-F5344CB8AC3E}">
-        <p14:creationId xmlns:p14="http://schemas.microsoft.com/office/powerpoint/2010/main" val="1864689859"/>
+        <p14:creationId xmlns:p14="http://schemas.microsoft.com/office/powerpoint/2010/main" val="356478586"/>
       </p:ext>
     </p:extLst>
   </p:cSld>
@@ -16818,6 +16865,13 @@
   <p:clrMapOvr>
     <a:masterClrMapping/>
   </p:clrMapOvr>
+  <p:timing>
+    <p:tnLst>
+      <p:par>
+        <p:cTn id="1" dur="indefinite" restart="never" nodeType="tmRoot"/>
+      </p:par>
+    </p:tnLst>
+  </p:timing>
 </p:sld>
 </file>
 
@@ -16855,7 +16909,7 @@
           <a:p>
             <a:r>
               <a:rPr lang="en-US" dirty="0" smtClean="0"/>
-              <a:t>Project discussion</a:t>
+              <a:t>APIs and URL endpoints</a:t>
             </a:r>
             <a:endParaRPr lang="en-US" dirty="0"/>
           </a:p>
@@ -16883,7 +16937,7 @@
     </p:spTree>
     <p:extLst>
       <p:ext uri="{BB962C8B-B14F-4D97-AF65-F5344CB8AC3E}">
-        <p14:creationId xmlns:p14="http://schemas.microsoft.com/office/powerpoint/2010/main" val="847991577"/>
+        <p14:creationId xmlns:p14="http://schemas.microsoft.com/office/powerpoint/2010/main" val="1864689859"/>
       </p:ext>
     </p:extLst>
   </p:cSld>
@@ -16927,7 +16981,7 @@
           <a:p>
             <a:r>
               <a:rPr lang="en-US" dirty="0" smtClean="0"/>
-              <a:t>Data workflow mapping</a:t>
+              <a:t>Project discussion</a:t>
             </a:r>
             <a:endParaRPr lang="en-US" dirty="0"/>
           </a:p>
@@ -16955,7 +17009,7 @@
     </p:spTree>
     <p:extLst>
       <p:ext uri="{BB962C8B-B14F-4D97-AF65-F5344CB8AC3E}">
-        <p14:creationId xmlns:p14="http://schemas.microsoft.com/office/powerpoint/2010/main" val="708937106"/>
+        <p14:creationId xmlns:p14="http://schemas.microsoft.com/office/powerpoint/2010/main" val="847991577"/>
       </p:ext>
     </p:extLst>
   </p:cSld>
@@ -16999,7 +17053,7 @@
           <a:p>
             <a:r>
               <a:rPr lang="en-US" dirty="0" smtClean="0"/>
-              <a:t>Day 2</a:t>
+              <a:t>Data workflow mapping</a:t>
             </a:r>
             <a:endParaRPr lang="en-US" dirty="0"/>
           </a:p>
@@ -17027,7 +17081,7 @@
     </p:spTree>
     <p:extLst>
       <p:ext uri="{BB962C8B-B14F-4D97-AF65-F5344CB8AC3E}">
-        <p14:creationId xmlns:p14="http://schemas.microsoft.com/office/powerpoint/2010/main" val="56162914"/>
+        <p14:creationId xmlns:p14="http://schemas.microsoft.com/office/powerpoint/2010/main" val="708937106"/>
       </p:ext>
     </p:extLst>
   </p:cSld>
@@ -17071,7 +17125,7 @@
           <a:p>
             <a:r>
               <a:rPr lang="en-US" dirty="0" smtClean="0"/>
-              <a:t>More Project Discussion</a:t>
+              <a:t>Day 2</a:t>
             </a:r>
             <a:endParaRPr lang="en-US" dirty="0"/>
           </a:p>
@@ -17099,7 +17153,7 @@
     </p:spTree>
     <p:extLst>
       <p:ext uri="{BB962C8B-B14F-4D97-AF65-F5344CB8AC3E}">
-        <p14:creationId xmlns:p14="http://schemas.microsoft.com/office/powerpoint/2010/main" val="2042803513"/>
+        <p14:creationId xmlns:p14="http://schemas.microsoft.com/office/powerpoint/2010/main" val="56162914"/>
       </p:ext>
     </p:extLst>
   </p:cSld>
@@ -17128,7 +17182,7 @@
       </p:grpSpPr>
       <p:sp>
         <p:nvSpPr>
-          <p:cNvPr id="4" name="Title 3"/>
+          <p:cNvPr id="2" name="Title 1"/>
           <p:cNvSpPr>
             <a:spLocks noGrp="1"/>
           </p:cNvSpPr>
@@ -17143,7 +17197,7 @@
           <a:p>
             <a:r>
               <a:rPr lang="en-US" dirty="0" smtClean="0"/>
-              <a:t>Did you think of anything new?</a:t>
+              <a:t>More Project Discussion</a:t>
             </a:r>
             <a:endParaRPr lang="en-US" dirty="0"/>
           </a:p>
@@ -17151,50 +17205,27 @@
       </p:sp>
       <p:sp>
         <p:nvSpPr>
-          <p:cNvPr id="5" name="Content Placeholder 4"/>
+          <p:cNvPr id="3" name="Text Placeholder 2"/>
           <p:cNvSpPr>
             <a:spLocks noGrp="1"/>
           </p:cNvSpPr>
           <p:nvPr>
-            <p:ph idx="1"/>
+            <p:ph type="body" idx="1"/>
           </p:nvPr>
         </p:nvSpPr>
         <p:spPr/>
         <p:txBody>
-          <a:bodyPr>
-            <a:normAutofit/>
-          </a:bodyPr>
+          <a:bodyPr/>
           <a:lstStyle/>
           <a:p>
-            <a:pPr>
-              <a:buFont typeface="Arial" charset="0"/>
-              <a:buChar char="•"/>
-            </a:pPr>
-            <a:r>
-              <a:rPr lang="en-US" sz="2800" dirty="0" smtClean="0"/>
-              <a:t> Any new ideas sparked overnight?</a:t>
-            </a:r>
-          </a:p>
-          <a:p>
-            <a:pPr>
-              <a:buFont typeface="Arial" charset="0"/>
-              <a:buChar char="•"/>
-            </a:pPr>
-            <a:r>
-              <a:rPr lang="en-US" sz="2800" dirty="0"/>
-              <a:t> </a:t>
-            </a:r>
-            <a:r>
-              <a:rPr lang="en-US" sz="2800" dirty="0" smtClean="0"/>
-              <a:t>Any questions or hopes of things that I’ll get into?</a:t>
-            </a:r>
+            <a:endParaRPr lang="en-US"/>
           </a:p>
         </p:txBody>
       </p:sp>
     </p:spTree>
     <p:extLst>
       <p:ext uri="{BB962C8B-B14F-4D97-AF65-F5344CB8AC3E}">
-        <p14:creationId xmlns:p14="http://schemas.microsoft.com/office/powerpoint/2010/main" val="256673899"/>
+        <p14:creationId xmlns:p14="http://schemas.microsoft.com/office/powerpoint/2010/main" val="2042803513"/>
       </p:ext>
     </p:extLst>
   </p:cSld>
@@ -17238,7 +17269,7 @@
           <a:p>
             <a:r>
               <a:rPr lang="en-US" dirty="0" smtClean="0"/>
-              <a:t>Common data formats: JSON, XML, CSV, Regex</a:t>
+              <a:t>Did you think of anything new?</a:t>
             </a:r>
             <a:endParaRPr lang="en-US" dirty="0"/>
           </a:p>
@@ -17246,27 +17277,50 @@
       </p:sp>
       <p:sp>
         <p:nvSpPr>
-          <p:cNvPr id="5" name="Text Placeholder 4"/>
+          <p:cNvPr id="5" name="Content Placeholder 4"/>
           <p:cNvSpPr>
             <a:spLocks noGrp="1"/>
           </p:cNvSpPr>
           <p:nvPr>
-            <p:ph type="body" idx="1"/>
+            <p:ph idx="1"/>
           </p:nvPr>
         </p:nvSpPr>
         <p:spPr/>
         <p:txBody>
-          <a:bodyPr/>
+          <a:bodyPr>
+            <a:normAutofit/>
+          </a:bodyPr>
           <a:lstStyle/>
           <a:p>
-            <a:endParaRPr lang="en-US"/>
+            <a:pPr>
+              <a:buFont typeface="Arial" charset="0"/>
+              <a:buChar char="•"/>
+            </a:pPr>
+            <a:r>
+              <a:rPr lang="en-US" sz="2800" dirty="0" smtClean="0"/>
+              <a:t> Any new ideas sparked overnight?</a:t>
+            </a:r>
+          </a:p>
+          <a:p>
+            <a:pPr>
+              <a:buFont typeface="Arial" charset="0"/>
+              <a:buChar char="•"/>
+            </a:pPr>
+            <a:r>
+              <a:rPr lang="en-US" sz="2800" dirty="0"/>
+              <a:t> </a:t>
+            </a:r>
+            <a:r>
+              <a:rPr lang="en-US" sz="2800" dirty="0" smtClean="0"/>
+              <a:t>Any questions or hopes of things that I’ll get into?</a:t>
+            </a:r>
           </a:p>
         </p:txBody>
       </p:sp>
     </p:spTree>
     <p:extLst>
       <p:ext uri="{BB962C8B-B14F-4D97-AF65-F5344CB8AC3E}">
-        <p14:creationId xmlns:p14="http://schemas.microsoft.com/office/powerpoint/2010/main" val="1880549992"/>
+        <p14:creationId xmlns:p14="http://schemas.microsoft.com/office/powerpoint/2010/main" val="256673899"/>
       </p:ext>
     </p:extLst>
   </p:cSld>
@@ -17295,7 +17349,7 @@
       </p:grpSpPr>
       <p:sp>
         <p:nvSpPr>
-          <p:cNvPr id="2" name="Title 1"/>
+          <p:cNvPr id="4" name="Title 3"/>
           <p:cNvSpPr>
             <a:spLocks noGrp="1"/>
           </p:cNvSpPr>
@@ -17310,7 +17364,7 @@
           <a:p>
             <a:r>
               <a:rPr lang="en-US" dirty="0" smtClean="0"/>
-              <a:t>Personal Learning Plans</a:t>
+              <a:t>Common data formats: JSON, XML, CSV, Regex</a:t>
             </a:r>
             <a:endParaRPr lang="en-US" dirty="0"/>
           </a:p>
@@ -17318,7 +17372,7 @@
       </p:sp>
       <p:sp>
         <p:nvSpPr>
-          <p:cNvPr id="3" name="Text Placeholder 2"/>
+          <p:cNvPr id="5" name="Text Placeholder 4"/>
           <p:cNvSpPr>
             <a:spLocks noGrp="1"/>
           </p:cNvSpPr>
@@ -17338,7 +17392,7 @@
     </p:spTree>
     <p:extLst>
       <p:ext uri="{BB962C8B-B14F-4D97-AF65-F5344CB8AC3E}">
-        <p14:creationId xmlns:p14="http://schemas.microsoft.com/office/powerpoint/2010/main" val="1893297473"/>
+        <p14:creationId xmlns:p14="http://schemas.microsoft.com/office/powerpoint/2010/main" val="1880549992"/>
       </p:ext>
     </p:extLst>
   </p:cSld>
@@ -17382,7 +17436,7 @@
           <a:p>
             <a:r>
               <a:rPr lang="en-US" dirty="0" smtClean="0"/>
-              <a:t>Activity 1: Free writing</a:t>
+              <a:t>Personal Learning Plans</a:t>
             </a:r>
             <a:endParaRPr lang="en-US" dirty="0"/>
           </a:p>
@@ -17390,12 +17444,12 @@
       </p:sp>
       <p:sp>
         <p:nvSpPr>
-          <p:cNvPr id="3" name="Content Placeholder 2"/>
+          <p:cNvPr id="3" name="Text Placeholder 2"/>
           <p:cNvSpPr>
             <a:spLocks noGrp="1"/>
           </p:cNvSpPr>
           <p:nvPr>
-            <p:ph idx="1"/>
+            <p:ph type="body" idx="1"/>
           </p:nvPr>
         </p:nvSpPr>
         <p:spPr/>
@@ -17403,59 +17457,14 @@
           <a:bodyPr/>
           <a:lstStyle/>
           <a:p>
-            <a:r>
-              <a:rPr lang="en-US" sz="2400" dirty="0"/>
-              <a:t>You’re going to free write for 7 minutes.  Rules:</a:t>
-            </a:r>
-          </a:p>
-          <a:p>
-            <a:pPr lvl="1"/>
-            <a:r>
-              <a:rPr lang="en-US" sz="2200" dirty="0"/>
-              <a:t>No stopping to edit or format</a:t>
-            </a:r>
-          </a:p>
-          <a:p>
-            <a:pPr lvl="1"/>
-            <a:r>
-              <a:rPr lang="en-US" sz="2200" dirty="0"/>
-              <a:t>Don’t worry about language syntax or structure</a:t>
-            </a:r>
-          </a:p>
-          <a:p>
-            <a:pPr lvl="1"/>
-            <a:r>
-              <a:rPr lang="en-US" sz="2200" dirty="0"/>
-              <a:t>You must keep writing until the timer goes </a:t>
-            </a:r>
-            <a:r>
-              <a:rPr lang="en-US" sz="2200" dirty="0" smtClean="0"/>
-              <a:t>off</a:t>
-            </a:r>
-          </a:p>
-          <a:p>
-            <a:pPr lvl="1"/>
-            <a:r>
-              <a:rPr lang="en-US" sz="2200" dirty="0" smtClean="0"/>
-              <a:t>Not sure what to write? Just keep going!</a:t>
-            </a:r>
-          </a:p>
-          <a:p>
-            <a:r>
-              <a:rPr lang="en-US" sz="2400" dirty="0" smtClean="0"/>
-              <a:t>I’ll keep time. Don’t start until I say.</a:t>
-            </a:r>
-            <a:endParaRPr lang="en-US" sz="2400" dirty="0"/>
-          </a:p>
-          <a:p>
-            <a:endParaRPr lang="en-US" dirty="0"/>
+            <a:endParaRPr lang="en-US"/>
           </a:p>
         </p:txBody>
       </p:sp>
     </p:spTree>
     <p:extLst>
       <p:ext uri="{BB962C8B-B14F-4D97-AF65-F5344CB8AC3E}">
-        <p14:creationId xmlns:p14="http://schemas.microsoft.com/office/powerpoint/2010/main" val="123679452"/>
+        <p14:creationId xmlns:p14="http://schemas.microsoft.com/office/powerpoint/2010/main" val="1893297473"/>
       </p:ext>
     </p:extLst>
   </p:cSld>
@@ -17499,14 +17508,7 @@
           <a:p>
             <a:r>
               <a:rPr lang="en-US" dirty="0" smtClean="0"/>
-              <a:t>Activity 2: organize</a:t>
-            </a:r>
-            <a:br>
-              <a:rPr lang="en-US" dirty="0" smtClean="0"/>
-            </a:br>
-            <a:r>
-              <a:rPr lang="en-US" dirty="0" smtClean="0"/>
-              <a:t>	- identify</a:t>
+              <a:t>Activity 1: Free writing</a:t>
             </a:r>
             <a:endParaRPr lang="en-US" dirty="0"/>
           </a:p>
@@ -17524,42 +17526,62 @@
         </p:nvSpPr>
         <p:spPr/>
         <p:txBody>
-          <a:bodyPr>
-            <a:normAutofit/>
-          </a:bodyPr>
+          <a:bodyPr/>
           <a:lstStyle/>
           <a:p>
             <a:r>
+              <a:rPr lang="en-US" sz="2400" dirty="0"/>
+              <a:t>You’re going to free write for 7 minutes.  Rules:</a:t>
+            </a:r>
+          </a:p>
+          <a:p>
+            <a:pPr lvl="1"/>
+            <a:r>
+              <a:rPr lang="en-US" sz="2200" dirty="0"/>
+              <a:t>No stopping to edit or format</a:t>
+            </a:r>
+          </a:p>
+          <a:p>
+            <a:pPr lvl="1"/>
+            <a:r>
+              <a:rPr lang="en-US" sz="2200" dirty="0"/>
+              <a:t>Don’t worry about language syntax or structure</a:t>
+            </a:r>
+          </a:p>
+          <a:p>
+            <a:pPr lvl="1"/>
+            <a:r>
+              <a:rPr lang="en-US" sz="2200" dirty="0"/>
+              <a:t>You must keep writing until the timer goes </a:t>
+            </a:r>
+            <a:r>
+              <a:rPr lang="en-US" sz="2200" dirty="0" smtClean="0"/>
+              <a:t>off</a:t>
+            </a:r>
+          </a:p>
+          <a:p>
+            <a:pPr lvl="1"/>
+            <a:r>
+              <a:rPr lang="en-US" sz="2200" dirty="0" smtClean="0"/>
+              <a:t>Not sure what to write? Just keep going!</a:t>
+            </a:r>
+          </a:p>
+          <a:p>
+            <a:r>
               <a:rPr lang="en-US" sz="2400" dirty="0" smtClean="0"/>
-              <a:t>Take a few colors of markers or pencils.</a:t>
-            </a:r>
-          </a:p>
-          <a:p>
-            <a:r>
-              <a:rPr lang="en-US" sz="2400" dirty="0" smtClean="0"/>
-              <a:t>Go back through what you wrote and mark up the subjects that you mentioned.</a:t>
-            </a:r>
-          </a:p>
-          <a:p>
-            <a:pPr lvl="1"/>
-            <a:r>
-              <a:rPr lang="en-US" sz="2200" dirty="0" smtClean="0"/>
-              <a:t>Color code as desired</a:t>
-            </a:r>
-            <a:endParaRPr lang="en-US" sz="2200" dirty="0"/>
-          </a:p>
-          <a:p>
-            <a:r>
-              <a:rPr lang="en-US" sz="2400" dirty="0" smtClean="0"/>
-              <a:t>How many do we all have?</a:t>
-            </a:r>
+              <a:t>I’ll keep time. Don’t start until I say.</a:t>
+            </a:r>
+            <a:endParaRPr lang="en-US" sz="2400" dirty="0"/>
+          </a:p>
+          <a:p>
+            <a:endParaRPr lang="en-US" dirty="0"/>
           </a:p>
         </p:txBody>
       </p:sp>
     </p:spTree>
     <p:extLst>
       <p:ext uri="{BB962C8B-B14F-4D97-AF65-F5344CB8AC3E}">
-        <p14:creationId xmlns:p14="http://schemas.microsoft.com/office/powerpoint/2010/main" val="2063863115"/>
+        <p14:creationId xmlns:p14="http://schemas.microsoft.com/office/powerpoint/2010/main" val="123679452"/>
       </p:ext>
     </p:extLst>
   </p:cSld>
@@ -17609,12 +17631,8 @@
               <a:rPr lang="en-US" dirty="0" smtClean="0"/>
             </a:br>
             <a:r>
-              <a:rPr lang="en-US" dirty="0"/>
-              <a:t>	</a:t>
-            </a:r>
-            <a:r>
               <a:rPr lang="en-US" dirty="0" smtClean="0"/>
-              <a:t>- categories</a:t>
+              <a:t>	- identify</a:t>
             </a:r>
             <a:endParaRPr lang="en-US" dirty="0"/>
           </a:p>
@@ -17630,12 +17648,7 @@
             <p:ph idx="1"/>
           </p:nvPr>
         </p:nvSpPr>
-        <p:spPr>
-          <a:xfrm>
-            <a:off x="938758" y="2286002"/>
-            <a:ext cx="7633742" cy="4285486"/>
-          </a:xfrm>
-        </p:spPr>
+        <p:spPr/>
         <p:txBody>
           <a:bodyPr>
             <a:normAutofit/>
@@ -17644,33 +17657,27 @@
           <a:p>
             <a:r>
               <a:rPr lang="en-US" sz="2400" dirty="0" smtClean="0"/>
-              <a:t>Take our your stack of big sticky notes and transcribe your items onto them.  One item per note.</a:t>
-            </a:r>
-            <a:endParaRPr lang="en-US" sz="2200" dirty="0" smtClean="0"/>
+              <a:t>Take a few colors of markers or pencils.</a:t>
+            </a:r>
           </a:p>
           <a:p>
             <a:r>
               <a:rPr lang="en-US" sz="2400" dirty="0" smtClean="0"/>
-              <a:t>Play with physically arranging them on the table into 2-3 categories.  These can be any that you want.</a:t>
-            </a:r>
+              <a:t>Go back through what you wrote and mark up the subjects that you mentioned.</a:t>
+            </a:r>
+          </a:p>
+          <a:p>
+            <a:pPr lvl="1"/>
+            <a:r>
+              <a:rPr lang="en-US" sz="2200" dirty="0" smtClean="0"/>
+              <a:t>Color code as desired</a:t>
+            </a:r>
+            <a:endParaRPr lang="en-US" sz="2200" dirty="0"/>
           </a:p>
           <a:p>
             <a:r>
               <a:rPr lang="en-US" sz="2400" dirty="0" smtClean="0"/>
-              <a:t>Groups to consider:</a:t>
-            </a:r>
-          </a:p>
-          <a:p>
-            <a:pPr lvl="1"/>
-            <a:r>
-              <a:rPr lang="en-US" sz="2200" dirty="0" smtClean="0"/>
-              <a:t>Tools, methods, skills, projects, things you were directed to do, things you want to do, etc.</a:t>
-            </a:r>
-          </a:p>
-          <a:p>
-            <a:r>
-              <a:rPr lang="en-US" sz="2400" dirty="0" smtClean="0"/>
-              <a:t>This is mostly for you to better understand your own needs, so doesn't need to be scientific.</a:t>
+              <a:t>How many do we all have?</a:t>
             </a:r>
           </a:p>
         </p:txBody>
@@ -17678,7 +17685,7 @@
     </p:spTree>
     <p:extLst>
       <p:ext uri="{BB962C8B-B14F-4D97-AF65-F5344CB8AC3E}">
-        <p14:creationId xmlns:p14="http://schemas.microsoft.com/office/powerpoint/2010/main" val="1191507461"/>
+        <p14:creationId xmlns:p14="http://schemas.microsoft.com/office/powerpoint/2010/main" val="2063863115"/>
       </p:ext>
     </p:extLst>
   </p:cSld>
@@ -17781,6 +17788,13 @@
   <p:clrMapOvr>
     <a:masterClrMapping/>
   </p:clrMapOvr>
+  <p:timing>
+    <p:tnLst>
+      <p:par>
+        <p:cTn id="1" dur="indefinite" restart="never" nodeType="tmRoot"/>
+      </p:par>
+    </p:tnLst>
+  </p:timing>
 </p:sld>
 </file>
 
@@ -17829,7 +17843,7 @@
             </a:r>
             <a:r>
               <a:rPr lang="en-US" dirty="0" smtClean="0"/>
-              <a:t>- discuss</a:t>
+              <a:t>- categories</a:t>
             </a:r>
             <a:endParaRPr lang="en-US" dirty="0"/>
           </a:p>
@@ -17848,7 +17862,7 @@
         <p:spPr>
           <a:xfrm>
             <a:off x="938758" y="2286002"/>
-            <a:ext cx="7633742" cy="4029454"/>
+            <a:ext cx="7633742" cy="4285486"/>
           </a:xfrm>
         </p:spPr>
         <p:txBody>
@@ -17859,48 +17873,41 @@
           <a:p>
             <a:r>
               <a:rPr lang="en-US" sz="2400" dirty="0" smtClean="0"/>
-              <a:t>Discuss</a:t>
+              <a:t>Take our your stack of big sticky notes and transcribe your items onto them.  One item per note.</a:t>
+            </a:r>
+            <a:endParaRPr lang="en-US" sz="2200" dirty="0" smtClean="0"/>
+          </a:p>
+          <a:p>
+            <a:r>
+              <a:rPr lang="en-US" sz="2400" dirty="0" smtClean="0"/>
+              <a:t>Play with physically arranging them on the table into 2-3 categories.  These can be any that you want.</a:t>
+            </a:r>
+          </a:p>
+          <a:p>
+            <a:r>
+              <a:rPr lang="en-US" sz="2400" dirty="0" smtClean="0"/>
+              <a:t>Groups to consider:</a:t>
             </a:r>
           </a:p>
           <a:p>
             <a:pPr lvl="1"/>
             <a:r>
               <a:rPr lang="en-US" sz="2200" dirty="0" smtClean="0"/>
-              <a:t>Report out all the categories that you decided on.</a:t>
-            </a:r>
-            <a:endParaRPr lang="en-US" sz="2400" dirty="0"/>
-          </a:p>
-          <a:p>
-            <a:endParaRPr lang="en-US" sz="2400" dirty="0" smtClean="0"/>
+              <a:t>Tools, methods, skills, projects, things you were directed to do, things you want to do, etc.</a:t>
+            </a:r>
           </a:p>
           <a:p>
             <a:r>
               <a:rPr lang="en-US" sz="2400" dirty="0" smtClean="0"/>
-              <a:t>Review and add any color codes to the sticky notes if that makes sense. </a:t>
-            </a:r>
-          </a:p>
-          <a:p>
-            <a:endParaRPr lang="en-US" sz="2400" dirty="0"/>
-          </a:p>
-          <a:p>
-            <a:r>
-              <a:rPr lang="en-US" sz="2400" dirty="0" smtClean="0"/>
-              <a:t>Write down the categories you select on your paper.</a:t>
-            </a:r>
-          </a:p>
-          <a:p>
-            <a:r>
-              <a:rPr lang="en-US" sz="2400" dirty="0" smtClean="0"/>
-              <a:t>Move into smaller topical groups if that makes sense.</a:t>
-            </a:r>
-            <a:endParaRPr lang="en-US" sz="2000" dirty="0" smtClean="0"/>
+              <a:t>This is mostly for you to better understand your own needs, so doesn't need to be scientific.</a:t>
+            </a:r>
           </a:p>
         </p:txBody>
       </p:sp>
     </p:spTree>
     <p:extLst>
       <p:ext uri="{BB962C8B-B14F-4D97-AF65-F5344CB8AC3E}">
-        <p14:creationId xmlns:p14="http://schemas.microsoft.com/office/powerpoint/2010/main" val="380888752"/>
+        <p14:creationId xmlns:p14="http://schemas.microsoft.com/office/powerpoint/2010/main" val="1191507461"/>
       </p:ext>
     </p:extLst>
   </p:cSld>
@@ -17955,7 +17962,7 @@
             </a:r>
             <a:r>
               <a:rPr lang="en-US" dirty="0" smtClean="0"/>
-              <a:t>- rename/clean up</a:t>
+              <a:t>- discuss</a:t>
             </a:r>
             <a:endParaRPr lang="en-US" dirty="0"/>
           </a:p>
@@ -17984,68 +17991,49 @@
           <a:lstStyle/>
           <a:p>
             <a:r>
-              <a:rPr lang="en-US" sz="2800" dirty="0" smtClean="0"/>
-              <a:t>Now that you have groups:</a:t>
-            </a:r>
-          </a:p>
-          <a:p>
+              <a:rPr lang="en-US" sz="2400" dirty="0" smtClean="0"/>
+              <a:t>Discuss</a:t>
+            </a:r>
+          </a:p>
+          <a:p>
+            <a:pPr lvl="1"/>
             <a:r>
               <a:rPr lang="en-US" sz="2200" dirty="0" smtClean="0"/>
-              <a:t>Consider the names you have chosen.</a:t>
-            </a:r>
-          </a:p>
-          <a:p>
-            <a:r>
-              <a:rPr lang="en-US" sz="2200" dirty="0" smtClean="0"/>
-              <a:t>Anything you want to</a:t>
-            </a:r>
-            <a:r>
-              <a:rPr lang="mr-IN" sz="2200" dirty="0" smtClean="0"/>
-              <a:t>…</a:t>
-            </a:r>
-            <a:endParaRPr lang="en-US" sz="2200" dirty="0" smtClean="0"/>
-          </a:p>
-          <a:p>
-            <a:pPr lvl="1"/>
-            <a:r>
-              <a:rPr lang="en-US" dirty="0" smtClean="0"/>
-              <a:t>Combine?</a:t>
-            </a:r>
-          </a:p>
-          <a:p>
-            <a:pPr lvl="1"/>
-            <a:r>
-              <a:rPr lang="en-US" dirty="0" smtClean="0"/>
-              <a:t>Rename?</a:t>
-            </a:r>
-          </a:p>
-          <a:p>
-            <a:pPr lvl="1"/>
-            <a:r>
-              <a:rPr lang="en-US" dirty="0" smtClean="0"/>
-              <a:t>Split apart?</a:t>
-            </a:r>
-          </a:p>
-          <a:p>
-            <a:r>
-              <a:rPr lang="en-US" dirty="0" smtClean="0"/>
-              <a:t>On names</a:t>
-            </a:r>
-            <a:r>
-              <a:rPr lang="mr-IN" dirty="0" smtClean="0"/>
-              <a:t>…</a:t>
-            </a:r>
-            <a:r>
-              <a:rPr lang="en-US" dirty="0" smtClean="0"/>
-              <a:t>next slide, Elizabeth</a:t>
-            </a:r>
+              <a:t>Report out all the categories that you decided on.</a:t>
+            </a:r>
+            <a:endParaRPr lang="en-US" sz="2400" dirty="0"/>
+          </a:p>
+          <a:p>
+            <a:endParaRPr lang="en-US" sz="2400" dirty="0" smtClean="0"/>
+          </a:p>
+          <a:p>
+            <a:r>
+              <a:rPr lang="en-US" sz="2400" dirty="0" smtClean="0"/>
+              <a:t>Review and add any color codes to the sticky notes if that makes sense. </a:t>
+            </a:r>
+          </a:p>
+          <a:p>
+            <a:endParaRPr lang="en-US" sz="2400" dirty="0"/>
+          </a:p>
+          <a:p>
+            <a:r>
+              <a:rPr lang="en-US" sz="2400" dirty="0" smtClean="0"/>
+              <a:t>Write down the categories you select on your paper.</a:t>
+            </a:r>
+          </a:p>
+          <a:p>
+            <a:r>
+              <a:rPr lang="en-US" sz="2400" dirty="0" smtClean="0"/>
+              <a:t>Move into smaller topical groups if that makes sense.</a:t>
+            </a:r>
+            <a:endParaRPr lang="en-US" sz="2000" dirty="0" smtClean="0"/>
           </a:p>
         </p:txBody>
       </p:sp>
     </p:spTree>
     <p:extLst>
       <p:ext uri="{BB962C8B-B14F-4D97-AF65-F5344CB8AC3E}">
-        <p14:creationId xmlns:p14="http://schemas.microsoft.com/office/powerpoint/2010/main" val="2095986804"/>
+        <p14:creationId xmlns:p14="http://schemas.microsoft.com/office/powerpoint/2010/main" val="380888752"/>
       </p:ext>
     </p:extLst>
   </p:cSld>
@@ -18100,7 +18088,7 @@
             </a:r>
             <a:r>
               <a:rPr lang="en-US" dirty="0" smtClean="0"/>
-              <a:t>- monoliths</a:t>
+              <a:t>- rename/clean up</a:t>
             </a:r>
             <a:endParaRPr lang="en-US" dirty="0"/>
           </a:p>
@@ -18118,8 +18106,8 @@
         </p:nvSpPr>
         <p:spPr>
           <a:xfrm>
-            <a:off x="938758" y="2286001"/>
-            <a:ext cx="7633742" cy="4327449"/>
+            <a:off x="938758" y="2286002"/>
+            <a:ext cx="7633742" cy="4029454"/>
           </a:xfrm>
         </p:spPr>
         <p:txBody>
@@ -18129,73 +18117,68 @@
           <a:lstStyle/>
           <a:p>
             <a:r>
-              <a:rPr lang="en-US" sz="2400" dirty="0" smtClean="0"/>
-              <a:t>They need to be actionable</a:t>
-            </a:r>
+              <a:rPr lang="en-US" sz="2800" dirty="0" smtClean="0"/>
+              <a:t>Now that you have groups:</a:t>
+            </a:r>
+          </a:p>
+          <a:p>
+            <a:r>
+              <a:rPr lang="en-US" sz="2200" dirty="0" smtClean="0"/>
+              <a:t>Consider the names you have chosen.</a:t>
+            </a:r>
+          </a:p>
+          <a:p>
+            <a:r>
+              <a:rPr lang="en-US" sz="2200" dirty="0" smtClean="0"/>
+              <a:t>Anything you want to</a:t>
+            </a:r>
+            <a:r>
+              <a:rPr lang="mr-IN" sz="2200" dirty="0" smtClean="0"/>
+              <a:t>…</a:t>
+            </a:r>
+            <a:endParaRPr lang="en-US" sz="2200" dirty="0" smtClean="0"/>
           </a:p>
           <a:p>
             <a:pPr lvl="1"/>
             <a:r>
-              <a:rPr lang="en-US" sz="2200" dirty="0" smtClean="0"/>
-              <a:t>No: “learn R” / “be better at stats”</a:t>
+              <a:rPr lang="en-US" dirty="0" smtClean="0"/>
+              <a:t>Combine?</a:t>
             </a:r>
           </a:p>
           <a:p>
             <a:pPr lvl="1"/>
             <a:r>
-              <a:rPr lang="en-US" sz="2200" dirty="0" smtClean="0"/>
-              <a:t>Yes: “learn ggplot2 in R” / “learn R data types”</a:t>
-            </a:r>
-          </a:p>
-          <a:p>
-            <a:r>
-              <a:rPr lang="en-US" sz="2400" dirty="0" smtClean="0"/>
-              <a:t>Operationalize them to what specific thing you need.</a:t>
+              <a:rPr lang="en-US" dirty="0" smtClean="0"/>
+              <a:t>Rename?</a:t>
             </a:r>
           </a:p>
           <a:p>
             <a:pPr lvl="1"/>
             <a:r>
-              <a:rPr lang="en-US" sz="2200" dirty="0" smtClean="0"/>
-              <a:t>Tip:  ask yourself “what would it look like to have completed this?” if that isn’t clear, you need more.</a:t>
-            </a:r>
-          </a:p>
-          <a:p>
-            <a:pPr lvl="1"/>
-            <a:r>
-              <a:rPr lang="en-US" sz="2200" dirty="0" smtClean="0"/>
-              <a:t>Think “[activity] in [tool]” or a specific skill</a:t>
-            </a:r>
-          </a:p>
-          <a:p>
-            <a:r>
-              <a:rPr lang="en-US" sz="2400" dirty="0" smtClean="0"/>
-              <a:t>You may not be able to be more specific! That’s ok.</a:t>
-            </a:r>
-          </a:p>
-          <a:p>
-            <a:r>
-              <a:rPr lang="en-US" sz="2400" dirty="0" smtClean="0"/>
-              <a:t>Those are your </a:t>
-            </a:r>
-            <a:r>
-              <a:rPr lang="en-US" sz="2400" i="1" dirty="0" smtClean="0"/>
-              <a:t>monoliths</a:t>
-            </a:r>
-            <a:r>
-              <a:rPr lang="en-US" sz="2400" dirty="0" smtClean="0"/>
-              <a:t>.  Set those aside.</a:t>
-            </a:r>
-          </a:p>
-          <a:p>
-            <a:endParaRPr lang="en-US" sz="2400" dirty="0" smtClean="0"/>
+              <a:rPr lang="en-US" dirty="0" smtClean="0"/>
+              <a:t>Split apart?</a:t>
+            </a:r>
+          </a:p>
+          <a:p>
+            <a:r>
+              <a:rPr lang="en-US" dirty="0" smtClean="0"/>
+              <a:t>On names</a:t>
+            </a:r>
+            <a:r>
+              <a:rPr lang="mr-IN" dirty="0" smtClean="0"/>
+              <a:t>…</a:t>
+            </a:r>
+            <a:r>
+              <a:rPr lang="en-US" dirty="0" smtClean="0"/>
+              <a:t>next slide, Elizabeth</a:t>
+            </a:r>
           </a:p>
         </p:txBody>
       </p:sp>
     </p:spTree>
     <p:extLst>
       <p:ext uri="{BB962C8B-B14F-4D97-AF65-F5344CB8AC3E}">
-        <p14:creationId xmlns:p14="http://schemas.microsoft.com/office/powerpoint/2010/main" val="2075953087"/>
+        <p14:creationId xmlns:p14="http://schemas.microsoft.com/office/powerpoint/2010/main" val="2095986804"/>
       </p:ext>
     </p:extLst>
   </p:cSld>
@@ -18239,7 +18222,18 @@
           <a:p>
             <a:r>
               <a:rPr lang="en-US" dirty="0" smtClean="0"/>
-              <a:t>Activity 3: monoliths</a:t>
+              <a:t>Activity 2: organize</a:t>
+            </a:r>
+            <a:br>
+              <a:rPr lang="en-US" dirty="0" smtClean="0"/>
+            </a:br>
+            <a:r>
+              <a:rPr lang="en-US" dirty="0"/>
+              <a:t>	</a:t>
+            </a:r>
+            <a:r>
+              <a:rPr lang="en-US" dirty="0" smtClean="0"/>
+              <a:t>- monoliths</a:t>
             </a:r>
             <a:endParaRPr lang="en-US" dirty="0"/>
           </a:p>
@@ -18269,56 +18263,61 @@
           <a:p>
             <a:r>
               <a:rPr lang="en-US" sz="2400" dirty="0" smtClean="0"/>
-              <a:t>Can you:</a:t>
+              <a:t>They need to be actionable</a:t>
             </a:r>
           </a:p>
           <a:p>
             <a:pPr lvl="1"/>
             <a:r>
               <a:rPr lang="en-US" sz="2200" dirty="0" smtClean="0"/>
-              <a:t>Rephrase to be more specific?</a:t>
+              <a:t>No: “learn R” / “be better at stats”</a:t>
             </a:r>
           </a:p>
           <a:p>
             <a:pPr lvl="1"/>
             <a:r>
               <a:rPr lang="en-US" sz="2200" dirty="0" smtClean="0"/>
-              <a:t>Break it up into several tasks?</a:t>
+              <a:t>Yes: “learn ggplot2 in R” / “learn R data types”</a:t>
+            </a:r>
+          </a:p>
+          <a:p>
+            <a:r>
+              <a:rPr lang="en-US" sz="2400" dirty="0" smtClean="0"/>
+              <a:t>Operationalize them to what specific thing you need.</a:t>
             </a:r>
           </a:p>
           <a:p>
             <a:pPr lvl="1"/>
             <a:r>
               <a:rPr lang="en-US" sz="2200" dirty="0" smtClean="0"/>
-              <a:t>Identify dependencies to prioritize first?</a:t>
+              <a:t>Tip:  ask yourself “what would it look like to have completed this?” if that isn’t clear, you need more.</a:t>
+            </a:r>
+          </a:p>
+          <a:p>
+            <a:pPr lvl="1"/>
+            <a:r>
+              <a:rPr lang="en-US" sz="2200" dirty="0" smtClean="0"/>
+              <a:t>Think “[activity] in [tool]” or a specific skill</a:t>
             </a:r>
           </a:p>
           <a:p>
             <a:r>
               <a:rPr lang="en-US" sz="2400" dirty="0" smtClean="0"/>
-              <a:t>There are 2 kinds:</a:t>
-            </a:r>
-          </a:p>
-          <a:p>
-            <a:pPr lvl="1"/>
-            <a:r>
-              <a:rPr lang="en-US" sz="2200" dirty="0" smtClean="0"/>
-              <a:t>Monsters:  Areas that you’ve collapsed many things into and are generally just large things to deal with</a:t>
-            </a:r>
-          </a:p>
-          <a:p>
-            <a:pPr lvl="1"/>
-            <a:r>
-              <a:rPr lang="en-US" sz="2200" dirty="0" err="1" smtClean="0"/>
-              <a:t>Vagueoliths</a:t>
-            </a:r>
-            <a:r>
-              <a:rPr lang="en-US" sz="2200" dirty="0"/>
-              <a:t>:</a:t>
-            </a:r>
-            <a:r>
-              <a:rPr lang="en-US" sz="2200" dirty="0" smtClean="0"/>
-              <a:t> which are broad topics without a clear learning goal at the end. These are things you cannot currently break apart.</a:t>
+              <a:t>You may not be able to be more specific! That’s ok.</a:t>
+            </a:r>
+          </a:p>
+          <a:p>
+            <a:r>
+              <a:rPr lang="en-US" sz="2400" dirty="0" smtClean="0"/>
+              <a:t>Those are your </a:t>
+            </a:r>
+            <a:r>
+              <a:rPr lang="en-US" sz="2400" i="1" dirty="0" smtClean="0"/>
+              <a:t>monoliths</a:t>
+            </a:r>
+            <a:r>
+              <a:rPr lang="en-US" sz="2400" dirty="0" smtClean="0"/>
+              <a:t>.  Set those aside.</a:t>
             </a:r>
           </a:p>
           <a:p>
@@ -18329,7 +18328,7 @@
     </p:spTree>
     <p:extLst>
       <p:ext uri="{BB962C8B-B14F-4D97-AF65-F5344CB8AC3E}">
-        <p14:creationId xmlns:p14="http://schemas.microsoft.com/office/powerpoint/2010/main" val="376720400"/>
+        <p14:creationId xmlns:p14="http://schemas.microsoft.com/office/powerpoint/2010/main" val="2075953087"/>
       </p:ext>
     </p:extLst>
   </p:cSld>
@@ -18375,17 +18374,6 @@
               <a:rPr lang="en-US" dirty="0" smtClean="0"/>
               <a:t>Activity 3: monoliths</a:t>
             </a:r>
-            <a:br>
-              <a:rPr lang="en-US" dirty="0" smtClean="0"/>
-            </a:br>
-            <a:r>
-              <a:rPr lang="en-US" dirty="0"/>
-              <a:t>	</a:t>
-            </a:r>
-            <a:r>
-              <a:rPr lang="en-US" dirty="0" smtClean="0"/>
-              <a:t>- monsters</a:t>
-            </a:r>
             <a:endParaRPr lang="en-US" dirty="0"/>
           </a:p>
         </p:txBody>
@@ -18414,53 +18402,67 @@
           <a:p>
             <a:r>
               <a:rPr lang="en-US" sz="2400" dirty="0" smtClean="0"/>
-              <a:t>Consider these topics and break them apart into 2-3 stages of learning.  Just do your best here.</a:t>
+              <a:t>Can you:</a:t>
+            </a:r>
+          </a:p>
+          <a:p>
+            <a:pPr lvl="1"/>
+            <a:r>
+              <a:rPr lang="en-US" sz="2200" dirty="0" smtClean="0"/>
+              <a:t>Rephrase to be more specific?</a:t>
+            </a:r>
+          </a:p>
+          <a:p>
+            <a:pPr lvl="1"/>
+            <a:r>
+              <a:rPr lang="en-US" sz="2200" dirty="0" smtClean="0"/>
+              <a:t>Break it up into several tasks?</a:t>
+            </a:r>
+          </a:p>
+          <a:p>
+            <a:pPr lvl="1"/>
+            <a:r>
+              <a:rPr lang="en-US" sz="2200" dirty="0" smtClean="0"/>
+              <a:t>Identify dependencies to prioritize first?</a:t>
             </a:r>
           </a:p>
           <a:p>
             <a:r>
               <a:rPr lang="en-US" sz="2400" dirty="0" smtClean="0"/>
-              <a:t>Anyone have some you don’t know enough to tell?</a:t>
-            </a:r>
-          </a:p>
-          <a:p>
-            <a:r>
-              <a:rPr lang="en-US" sz="2400" dirty="0" smtClean="0"/>
-              <a:t>Discuss.</a:t>
-            </a:r>
-          </a:p>
-          <a:p>
-            <a:r>
-              <a:rPr lang="en-US" sz="2400" dirty="0" smtClean="0"/>
-              <a:t>Put your monsters in your handout and make the new </a:t>
-            </a:r>
-            <a:r>
-              <a:rPr lang="en-US" sz="2400" dirty="0" err="1" smtClean="0"/>
-              <a:t>stickies</a:t>
-            </a:r>
-            <a:r>
-              <a:rPr lang="en-US" sz="2400" dirty="0"/>
-              <a:t> </a:t>
-            </a:r>
-            <a:r>
-              <a:rPr lang="en-US" sz="2400" dirty="0" smtClean="0"/>
-              <a:t>for those </a:t>
-            </a:r>
-            <a:r>
-              <a:rPr lang="en-US" sz="2400" dirty="0" err="1" smtClean="0"/>
-              <a:t>subitems</a:t>
-            </a:r>
-            <a:r>
-              <a:rPr lang="en-US" sz="2400" dirty="0" smtClean="0"/>
-              <a:t>. </a:t>
-            </a:r>
+              <a:t>There are 2 kinds:</a:t>
+            </a:r>
+          </a:p>
+          <a:p>
+            <a:pPr lvl="1"/>
+            <a:r>
+              <a:rPr lang="en-US" sz="2200" dirty="0" smtClean="0"/>
+              <a:t>Monsters:  Areas that you’ve collapsed many things into and are generally just large things to deal with</a:t>
+            </a:r>
+          </a:p>
+          <a:p>
+            <a:pPr lvl="1"/>
+            <a:r>
+              <a:rPr lang="en-US" sz="2200" dirty="0" err="1" smtClean="0"/>
+              <a:t>Vagueoliths</a:t>
+            </a:r>
+            <a:r>
+              <a:rPr lang="en-US" sz="2200" dirty="0"/>
+              <a:t>:</a:t>
+            </a:r>
+            <a:r>
+              <a:rPr lang="en-US" sz="2200" dirty="0" smtClean="0"/>
+              <a:t> which are broad topics without a clear learning goal at the end. These are things you cannot currently break apart.</a:t>
+            </a:r>
+          </a:p>
+          <a:p>
+            <a:endParaRPr lang="en-US" sz="2400" dirty="0" smtClean="0"/>
           </a:p>
         </p:txBody>
       </p:sp>
     </p:spTree>
     <p:extLst>
       <p:ext uri="{BB962C8B-B14F-4D97-AF65-F5344CB8AC3E}">
-        <p14:creationId xmlns:p14="http://schemas.microsoft.com/office/powerpoint/2010/main" val="757971444"/>
+        <p14:creationId xmlns:p14="http://schemas.microsoft.com/office/powerpoint/2010/main" val="376720400"/>
       </p:ext>
     </p:extLst>
   </p:cSld>
@@ -18515,11 +18517,7 @@
             </a:r>
             <a:r>
               <a:rPr lang="en-US" dirty="0" smtClean="0"/>
-              <a:t>- </a:t>
-            </a:r>
-            <a:r>
-              <a:rPr lang="en-US" dirty="0" err="1" smtClean="0"/>
-              <a:t>Vagueoliths</a:t>
+              <a:t>- monsters</a:t>
             </a:r>
             <a:endParaRPr lang="en-US" dirty="0"/>
           </a:p>
@@ -18549,50 +18547,45 @@
           <a:p>
             <a:r>
               <a:rPr lang="en-US" sz="2400" dirty="0" smtClean="0"/>
-              <a:t>These are the monoliths that you don’t know enough about the topic or the project to bust apart. </a:t>
+              <a:t>Consider these topics and break them apart into 2-3 stages of learning.  Just do your best here.</a:t>
             </a:r>
           </a:p>
           <a:p>
             <a:r>
               <a:rPr lang="en-US" sz="2400" dirty="0" smtClean="0"/>
-              <a:t>Options:</a:t>
-            </a:r>
-          </a:p>
-          <a:p>
-            <a:pPr lvl="1"/>
-            <a:r>
-              <a:rPr lang="en-US" sz="2200" dirty="0" smtClean="0"/>
-              <a:t>You can leave them there if you REALLY need to</a:t>
-            </a:r>
-          </a:p>
-          <a:p>
-            <a:pPr lvl="1"/>
-            <a:r>
-              <a:rPr lang="en-US" sz="2200" dirty="0" smtClean="0"/>
-              <a:t>What do you need to know before you can unpack it?</a:t>
-            </a:r>
-          </a:p>
-          <a:p>
-            <a:pPr lvl="1"/>
-            <a:r>
-              <a:rPr lang="en-US" sz="2200" dirty="0" smtClean="0"/>
-              <a:t>Take this time to email a buddy who might know, give yourself a </a:t>
-            </a:r>
-            <a:r>
-              <a:rPr lang="en-US" sz="2200" dirty="0" err="1" smtClean="0"/>
-              <a:t>todo</a:t>
-            </a:r>
-            <a:r>
-              <a:rPr lang="en-US" sz="2200" dirty="0" smtClean="0"/>
-              <a:t> list, or add an investigation task to you pile of </a:t>
-            </a:r>
-            <a:r>
-              <a:rPr lang="en-US" sz="2200" dirty="0" err="1" smtClean="0"/>
+              <a:t>Anyone have some you don’t know enough to tell?</a:t>
+            </a:r>
+          </a:p>
+          <a:p>
+            <a:r>
+              <a:rPr lang="en-US" sz="2400" dirty="0" smtClean="0"/>
+              <a:t>Discuss.</a:t>
+            </a:r>
+          </a:p>
+          <a:p>
+            <a:r>
+              <a:rPr lang="en-US" sz="2400" dirty="0" smtClean="0"/>
+              <a:t>Put your monsters in your handout and make the new </a:t>
+            </a:r>
+            <a:r>
+              <a:rPr lang="en-US" sz="2400" dirty="0" err="1" smtClean="0"/>
               <a:t>stickies</a:t>
             </a:r>
             <a:r>
-              <a:rPr lang="en-US" sz="2200" dirty="0" smtClean="0"/>
-              <a:t>.</a:t>
+              <a:rPr lang="en-US" sz="2400" dirty="0"/>
+              <a:t> </a:t>
+            </a:r>
+            <a:r>
+              <a:rPr lang="en-US" sz="2400" dirty="0" smtClean="0"/>
+              <a:t>for those </a:t>
+            </a:r>
+            <a:r>
+              <a:rPr lang="en-US" sz="2400" dirty="0" err="1" smtClean="0"/>
+              <a:t>subitems</a:t>
+            </a:r>
+            <a:r>
+              <a:rPr lang="en-US" sz="2400" dirty="0" smtClean="0"/>
+              <a:t>. </a:t>
             </a:r>
           </a:p>
         </p:txBody>
@@ -18600,7 +18593,7 @@
     </p:spTree>
     <p:extLst>
       <p:ext uri="{BB962C8B-B14F-4D97-AF65-F5344CB8AC3E}">
-        <p14:creationId xmlns:p14="http://schemas.microsoft.com/office/powerpoint/2010/main" val="353065304"/>
+        <p14:creationId xmlns:p14="http://schemas.microsoft.com/office/powerpoint/2010/main" val="757971444"/>
       </p:ext>
     </p:extLst>
   </p:cSld>
@@ -18644,7 +18637,22 @@
           <a:p>
             <a:r>
               <a:rPr lang="en-US" dirty="0" smtClean="0"/>
-              <a:t>Activity 4: design the grid</a:t>
+              <a:t>Activity 3: monoliths</a:t>
+            </a:r>
+            <a:br>
+              <a:rPr lang="en-US" dirty="0" smtClean="0"/>
+            </a:br>
+            <a:r>
+              <a:rPr lang="en-US" dirty="0"/>
+              <a:t>	</a:t>
+            </a:r>
+            <a:r>
+              <a:rPr lang="en-US" dirty="0" smtClean="0"/>
+              <a:t>- </a:t>
+            </a:r>
+            <a:r>
+              <a:rPr lang="en-US" dirty="0" err="1" smtClean="0"/>
+              <a:t>Vagueoliths</a:t>
             </a:r>
             <a:endParaRPr lang="en-US" dirty="0"/>
           </a:p>
@@ -18660,41 +18668,64 @@
             <p:ph idx="1"/>
           </p:nvPr>
         </p:nvSpPr>
-        <p:spPr/>
-        <p:txBody>
-          <a:bodyPr/>
+        <p:spPr>
+          <a:xfrm>
+            <a:off x="938758" y="2286001"/>
+            <a:ext cx="7633742" cy="4327449"/>
+          </a:xfrm>
+        </p:spPr>
+        <p:txBody>
+          <a:bodyPr>
+            <a:normAutofit/>
+          </a:bodyPr>
           <a:lstStyle/>
           <a:p>
             <a:r>
-              <a:rPr lang="en-US" dirty="0" smtClean="0"/>
-              <a:t>Get out one big piece of paper each.  Make some space for it at the table.</a:t>
-            </a:r>
-          </a:p>
-          <a:p>
-            <a:r>
-              <a:rPr lang="en-US" dirty="0" smtClean="0"/>
-              <a:t>There is a grid in your handout, but that’s for the end.</a:t>
-            </a:r>
-            <a:endParaRPr lang="en-US" dirty="0"/>
-          </a:p>
-          <a:p>
-            <a:r>
-              <a:rPr lang="en-US" dirty="0" smtClean="0"/>
-              <a:t>We’re going to use this grid to organize your notes by:</a:t>
+              <a:rPr lang="en-US" sz="2400" dirty="0" smtClean="0"/>
+              <a:t>These are the monoliths that you don’t know enough about the topic or the project to bust apart. </a:t>
+            </a:r>
+          </a:p>
+          <a:p>
+            <a:r>
+              <a:rPr lang="en-US" sz="2400" dirty="0" smtClean="0"/>
+              <a:t>Options:</a:t>
             </a:r>
           </a:p>
           <a:p>
             <a:pPr lvl="1"/>
             <a:r>
-              <a:rPr lang="en-US" dirty="0" smtClean="0"/>
-              <a:t>Time on the vertical</a:t>
+              <a:rPr lang="en-US" sz="2200" dirty="0" smtClean="0"/>
+              <a:t>You can leave them there if you REALLY need to</a:t>
             </a:r>
           </a:p>
           <a:p>
             <a:pPr lvl="1"/>
             <a:r>
-              <a:rPr lang="en-US" dirty="0" smtClean="0"/>
-              <a:t>Priority on the horizontal</a:t>
+              <a:rPr lang="en-US" sz="2200" dirty="0" smtClean="0"/>
+              <a:t>What do you need to know before you can unpack it?</a:t>
+            </a:r>
+          </a:p>
+          <a:p>
+            <a:pPr lvl="1"/>
+            <a:r>
+              <a:rPr lang="en-US" sz="2200" dirty="0" smtClean="0"/>
+              <a:t>Take this time to email a buddy who might know, give yourself a </a:t>
+            </a:r>
+            <a:r>
+              <a:rPr lang="en-US" sz="2200" dirty="0" err="1" smtClean="0"/>
+              <a:t>todo</a:t>
+            </a:r>
+            <a:r>
+              <a:rPr lang="en-US" sz="2200" dirty="0" smtClean="0"/>
+              <a:t> list, or add an investigation task to you pile of </a:t>
+            </a:r>
+            <a:r>
+              <a:rPr lang="en-US" sz="2200" dirty="0" err="1" smtClean="0"/>
+              <a:t>stickies</a:t>
+            </a:r>
+            <a:r>
+              <a:rPr lang="en-US" sz="2200" dirty="0" smtClean="0"/>
+              <a:t>.</a:t>
             </a:r>
           </a:p>
         </p:txBody>
@@ -18702,7 +18733,7 @@
     </p:spTree>
     <p:extLst>
       <p:ext uri="{BB962C8B-B14F-4D97-AF65-F5344CB8AC3E}">
-        <p14:creationId xmlns:p14="http://schemas.microsoft.com/office/powerpoint/2010/main" val="339849133"/>
+        <p14:creationId xmlns:p14="http://schemas.microsoft.com/office/powerpoint/2010/main" val="353065304"/>
       </p:ext>
     </p:extLst>
   </p:cSld>
@@ -18746,7 +18777,7 @@
           <a:p>
             <a:r>
               <a:rPr lang="en-US" dirty="0" smtClean="0"/>
-              <a:t>Activity 4: design the grid		- time</a:t>
+              <a:t>Activity 4: design the grid</a:t>
             </a:r>
             <a:endParaRPr lang="en-US" dirty="0"/>
           </a:p>
@@ -18764,60 +18795,39 @@
         </p:nvSpPr>
         <p:spPr/>
         <p:txBody>
-          <a:bodyPr>
-            <a:normAutofit/>
-          </a:bodyPr>
+          <a:bodyPr/>
           <a:lstStyle/>
           <a:p>
             <a:r>
-              <a:rPr lang="en-US" sz="2400" dirty="0" smtClean="0"/>
-              <a:t>Step 1: Figure out your time spans</a:t>
-            </a:r>
-          </a:p>
-          <a:p>
-            <a:r>
-              <a:rPr lang="en-US" sz="2400" dirty="0" smtClean="0"/>
-              <a:t>Right now these are:</a:t>
+              <a:rPr lang="en-US" dirty="0" smtClean="0"/>
+              <a:t>Get out one big piece of paper each.  Make some space for it at the table.</a:t>
+            </a:r>
+          </a:p>
+          <a:p>
+            <a:r>
+              <a:rPr lang="en-US" dirty="0" smtClean="0"/>
+              <a:t>There is a grid in your handout, but that’s for the end.</a:t>
+            </a:r>
+            <a:endParaRPr lang="en-US" dirty="0"/>
+          </a:p>
+          <a:p>
+            <a:r>
+              <a:rPr lang="en-US" dirty="0" smtClean="0"/>
+              <a:t>We’re going to use this grid to organize your notes by:</a:t>
             </a:r>
           </a:p>
           <a:p>
             <a:pPr lvl="1"/>
             <a:r>
-              <a:rPr lang="en-US" sz="2200" dirty="0" smtClean="0"/>
-              <a:t>Short</a:t>
+              <a:rPr lang="en-US" dirty="0" smtClean="0"/>
+              <a:t>Time on the vertical</a:t>
             </a:r>
           </a:p>
           <a:p>
             <a:pPr lvl="1"/>
             <a:r>
-              <a:rPr lang="en-US" sz="2200" dirty="0" smtClean="0"/>
-              <a:t>Medium</a:t>
-            </a:r>
-          </a:p>
-          <a:p>
-            <a:pPr lvl="1"/>
-            <a:r>
-              <a:rPr lang="en-US" sz="2200" dirty="0" smtClean="0"/>
-              <a:t>Long</a:t>
-            </a:r>
-          </a:p>
-          <a:p>
-            <a:r>
-              <a:rPr lang="en-US" sz="2400" dirty="0" smtClean="0"/>
-              <a:t>You need to figure out how long those are. </a:t>
-            </a:r>
-          </a:p>
-          <a:p>
-            <a:pPr lvl="1"/>
-            <a:r>
-              <a:rPr lang="en-US" sz="2200" dirty="0" smtClean="0"/>
-              <a:t>Use either number ranges or named events.</a:t>
-            </a:r>
-          </a:p>
-          <a:p>
-            <a:r>
-              <a:rPr lang="en-US" sz="2400" dirty="0" smtClean="0"/>
-              <a:t>Add these definitions to your handout.</a:t>
+              <a:rPr lang="en-US" dirty="0" smtClean="0"/>
+              <a:t>Priority on the horizontal</a:t>
             </a:r>
           </a:p>
         </p:txBody>
@@ -18825,7 +18835,7 @@
     </p:spTree>
     <p:extLst>
       <p:ext uri="{BB962C8B-B14F-4D97-AF65-F5344CB8AC3E}">
-        <p14:creationId xmlns:p14="http://schemas.microsoft.com/office/powerpoint/2010/main" val="1685360958"/>
+        <p14:creationId xmlns:p14="http://schemas.microsoft.com/office/powerpoint/2010/main" val="339849133"/>
       </p:ext>
     </p:extLst>
   </p:cSld>
@@ -18869,7 +18879,7 @@
           <a:p>
             <a:r>
               <a:rPr lang="en-US" dirty="0" smtClean="0"/>
-              <a:t>Activity 4: design the grid		- priorities</a:t>
+              <a:t>Activity 4: design the grid		- time</a:t>
             </a:r>
             <a:endParaRPr lang="en-US" dirty="0"/>
           </a:p>
@@ -18885,12 +18895,7 @@
             <p:ph idx="1"/>
           </p:nvPr>
         </p:nvSpPr>
-        <p:spPr>
-          <a:xfrm>
-            <a:off x="938758" y="2286002"/>
-            <a:ext cx="7633742" cy="4178593"/>
-          </a:xfrm>
-        </p:spPr>
+        <p:spPr/>
         <p:txBody>
           <a:bodyPr>
             <a:normAutofit/>
@@ -18899,66 +18904,53 @@
           <a:p>
             <a:r>
               <a:rPr lang="en-US" sz="2400" dirty="0" smtClean="0"/>
-              <a:t>Step 2: Priorities</a:t>
+              <a:t>Step 1: Figure out your time spans</a:t>
             </a:r>
           </a:p>
           <a:p>
             <a:r>
               <a:rPr lang="en-US" sz="2400" dirty="0" smtClean="0"/>
-              <a:t>Right now these are s at:</a:t>
+              <a:t>Right now these are:</a:t>
             </a:r>
           </a:p>
           <a:p>
             <a:pPr lvl="1"/>
             <a:r>
-              <a:rPr lang="en-US" sz="2200" b="1" dirty="0" smtClean="0"/>
-              <a:t>Need</a:t>
-            </a:r>
-            <a:r>
               <a:rPr lang="en-US" sz="2200" dirty="0" smtClean="0"/>
-              <a:t>:  things you’ll get fired for not doing, basically</a:t>
+              <a:t>Short</a:t>
             </a:r>
           </a:p>
           <a:p>
             <a:pPr lvl="1"/>
             <a:r>
-              <a:rPr lang="en-US" sz="2200" b="1" dirty="0" smtClean="0"/>
-              <a:t>Want</a:t>
-            </a:r>
-            <a:r>
               <a:rPr lang="en-US" sz="2200" dirty="0" smtClean="0"/>
-              <a:t>:  things you strongly desire, but nothing will be destroyed if you don’t.</a:t>
+              <a:t>Medium</a:t>
             </a:r>
           </a:p>
           <a:p>
             <a:pPr lvl="1"/>
             <a:r>
-              <a:rPr lang="en-US" sz="2200" b="1" dirty="0" smtClean="0"/>
-              <a:t>Watch</a:t>
-            </a:r>
-            <a:r>
               <a:rPr lang="en-US" sz="2200" dirty="0" smtClean="0"/>
-              <a:t>:  things that are interesting enough to keep on your radar, but nothing you want to act on right now.</a:t>
+              <a:t>Long</a:t>
             </a:r>
           </a:p>
           <a:p>
             <a:r>
               <a:rPr lang="en-US" sz="2400" dirty="0" smtClean="0"/>
-              <a:t>Change these names if you need </a:t>
-            </a:r>
-            <a:r>
-              <a:rPr lang="mr-IN" sz="2400" dirty="0" smtClean="0"/>
-              <a:t>–</a:t>
-            </a:r>
+              <a:t>You need to figure out how long those are. </a:t>
+            </a:r>
+          </a:p>
+          <a:p>
+            <a:pPr lvl="1"/>
+            <a:r>
+              <a:rPr lang="en-US" sz="2200" dirty="0" smtClean="0"/>
+              <a:t>Use either number ranges or named events.</a:t>
+            </a:r>
+          </a:p>
+          <a:p>
             <a:r>
               <a:rPr lang="en-US" sz="2400" dirty="0" smtClean="0"/>
-              <a:t> just remember how they match up.</a:t>
-            </a:r>
-          </a:p>
-          <a:p>
-            <a:r>
-              <a:rPr lang="en-US" sz="2400" dirty="0" smtClean="0"/>
-              <a:t>Add your choices to the handout</a:t>
+              <a:t>Add these definitions to your handout.</a:t>
             </a:r>
           </a:p>
         </p:txBody>
@@ -18966,7 +18958,7 @@
     </p:spTree>
     <p:extLst>
       <p:ext uri="{BB962C8B-B14F-4D97-AF65-F5344CB8AC3E}">
-        <p14:creationId xmlns:p14="http://schemas.microsoft.com/office/powerpoint/2010/main" val="552317176"/>
+        <p14:creationId xmlns:p14="http://schemas.microsoft.com/office/powerpoint/2010/main" val="1685360958"/>
       </p:ext>
     </p:extLst>
   </p:cSld>
@@ -19010,7 +19002,7 @@
           <a:p>
             <a:r>
               <a:rPr lang="en-US" dirty="0" smtClean="0"/>
-              <a:t>Activity 4: design the grid		- a pause for time</a:t>
+              <a:t>Activity 4: design the grid		- priorities</a:t>
             </a:r>
             <a:endParaRPr lang="en-US" dirty="0"/>
           </a:p>
@@ -19040,52 +19032,66 @@
           <a:p>
             <a:r>
               <a:rPr lang="en-US" sz="2400" dirty="0" smtClean="0"/>
-              <a:t>Now assemble your board.  Draw the appropriate number of cells (or a 3x3 if you didn’t change anything)</a:t>
+              <a:t>Step 2: Priorities</a:t>
             </a:r>
           </a:p>
           <a:p>
             <a:r>
               <a:rPr lang="en-US" sz="2400" dirty="0" smtClean="0"/>
-              <a:t>Lets stop and think about the time you have available.</a:t>
+              <a:t>Right now these are s at:</a:t>
+            </a:r>
+          </a:p>
+          <a:p>
+            <a:pPr lvl="1"/>
+            <a:r>
+              <a:rPr lang="en-US" sz="2200" b="1" dirty="0" smtClean="0"/>
+              <a:t>Need</a:t>
+            </a:r>
+            <a:r>
+              <a:rPr lang="en-US" sz="2200" dirty="0" smtClean="0"/>
+              <a:t>:  things you’ll get fired for not doing, basically</a:t>
+            </a:r>
+          </a:p>
+          <a:p>
+            <a:pPr lvl="1"/>
+            <a:r>
+              <a:rPr lang="en-US" sz="2200" b="1" dirty="0" smtClean="0"/>
+              <a:t>Want</a:t>
+            </a:r>
+            <a:r>
+              <a:rPr lang="en-US" sz="2200" dirty="0" smtClean="0"/>
+              <a:t>:  things you strongly desire, but nothing will be destroyed if you don’t.</a:t>
+            </a:r>
+          </a:p>
+          <a:p>
+            <a:pPr lvl="1"/>
+            <a:r>
+              <a:rPr lang="en-US" sz="2200" b="1" dirty="0" smtClean="0"/>
+              <a:t>Watch</a:t>
+            </a:r>
+            <a:r>
+              <a:rPr lang="en-US" sz="2200" dirty="0" smtClean="0"/>
+              <a:t>:  things that are interesting enough to keep on your radar, but nothing you want to act on right now.</a:t>
             </a:r>
           </a:p>
           <a:p>
             <a:r>
               <a:rPr lang="en-US" sz="2400" dirty="0" smtClean="0"/>
-              <a:t>How much time do you have per week or month during:</a:t>
-            </a:r>
-          </a:p>
-          <a:p>
-            <a:pPr lvl="1"/>
-            <a:r>
-              <a:rPr lang="en-US" sz="2200" dirty="0" smtClean="0"/>
-              <a:t>Work time?</a:t>
-            </a:r>
-          </a:p>
-          <a:p>
-            <a:pPr lvl="1"/>
-            <a:r>
-              <a:rPr lang="en-US" sz="2200" dirty="0" smtClean="0"/>
-              <a:t>Personal time?</a:t>
-            </a:r>
-          </a:p>
-          <a:p>
-            <a:pPr lvl="1"/>
-            <a:r>
-              <a:rPr lang="en-US" sz="2200" dirty="0" smtClean="0"/>
-              <a:t>Annual events (like conferences)</a:t>
-            </a:r>
-          </a:p>
-          <a:p>
+              <a:t>Change these names if you need </a:t>
+            </a:r>
+            <a:r>
+              <a:rPr lang="mr-IN" sz="2400" dirty="0" smtClean="0"/>
+              <a:t>–</a:t>
+            </a:r>
             <a:r>
               <a:rPr lang="en-US" sz="2400" dirty="0" smtClean="0"/>
-              <a:t>Which topics can you use work or research time for?</a:t>
+              <a:t> just remember how they match up.</a:t>
             </a:r>
           </a:p>
           <a:p>
             <a:r>
               <a:rPr lang="en-US" sz="2400" dirty="0" smtClean="0"/>
-              <a:t>Fill out your worksheet.</a:t>
+              <a:t>Add your choices to the handout</a:t>
             </a:r>
           </a:p>
         </p:txBody>
@@ -19093,7 +19099,7 @@
     </p:spTree>
     <p:extLst>
       <p:ext uri="{BB962C8B-B14F-4D97-AF65-F5344CB8AC3E}">
-        <p14:creationId xmlns:p14="http://schemas.microsoft.com/office/powerpoint/2010/main" val="1370454698"/>
+        <p14:creationId xmlns:p14="http://schemas.microsoft.com/office/powerpoint/2010/main" val="552317176"/>
       </p:ext>
     </p:extLst>
   </p:cSld>
@@ -19233,6 +19239,13 @@
   <p:clrMapOvr>
     <a:masterClrMapping/>
   </p:clrMapOvr>
+  <p:timing>
+    <p:tnLst>
+      <p:par>
+        <p:cTn id="1" dur="indefinite" restart="never" nodeType="tmRoot"/>
+      </p:par>
+    </p:tnLst>
+  </p:timing>
 </p:sld>
 </file>
 
@@ -19289,7 +19302,7 @@
         <p:spPr>
           <a:xfrm>
             <a:off x="938758" y="2286002"/>
-            <a:ext cx="7633742" cy="4391524"/>
+            <a:ext cx="7633742" cy="4178593"/>
           </a:xfrm>
         </p:spPr>
         <p:txBody>
@@ -19300,33 +19313,52 @@
           <a:p>
             <a:r>
               <a:rPr lang="en-US" sz="2400" dirty="0" smtClean="0"/>
-              <a:t>Consider the meaning of intersections between your time and priorities.  Take a moment to ponder what this means to you.</a:t>
+              <a:t>Now assemble your board.  Draw the appropriate number of cells (or a 3x3 if you didn’t change anything)</a:t>
             </a:r>
           </a:p>
           <a:p>
             <a:r>
               <a:rPr lang="en-US" sz="2400" dirty="0" smtClean="0"/>
-              <a:t>Generally: </a:t>
+              <a:t>Lets stop and think about the time you have available.</a:t>
+            </a:r>
+          </a:p>
+          <a:p>
+            <a:r>
+              <a:rPr lang="en-US" sz="2400" dirty="0" smtClean="0"/>
+              <a:t>How much time do you have per week or month during:</a:t>
             </a:r>
           </a:p>
           <a:p>
             <a:pPr lvl="1"/>
             <a:r>
               <a:rPr lang="en-US" sz="2200" dirty="0" smtClean="0"/>
-              <a:t>The soonest and highest priority items should be the most specific.</a:t>
+              <a:t>Work time?</a:t>
             </a:r>
           </a:p>
           <a:p>
             <a:pPr lvl="1"/>
             <a:r>
               <a:rPr lang="en-US" sz="2200" dirty="0" smtClean="0"/>
-              <a:t>The furthest away and lowest priority items can be ambiguous.</a:t>
+              <a:t>Personal time?</a:t>
+            </a:r>
+          </a:p>
+          <a:p>
+            <a:pPr lvl="1"/>
+            <a:r>
+              <a:rPr lang="en-US" sz="2200" dirty="0" smtClean="0"/>
+              <a:t>Annual events (like conferences)</a:t>
             </a:r>
           </a:p>
           <a:p>
             <a:r>
               <a:rPr lang="en-US" sz="2400" dirty="0" smtClean="0"/>
-              <a:t>This is a living document that you will need to revisit regularly.  That cycle depends on your needs.</a:t>
+              <a:t>Which topics can you use work or research time for?</a:t>
+            </a:r>
+          </a:p>
+          <a:p>
+            <a:r>
+              <a:rPr lang="en-US" sz="2400" dirty="0" smtClean="0"/>
+              <a:t>Fill out your worksheet.</a:t>
             </a:r>
           </a:p>
         </p:txBody>
@@ -19334,7 +19366,7 @@
     </p:spTree>
     <p:extLst>
       <p:ext uri="{BB962C8B-B14F-4D97-AF65-F5344CB8AC3E}">
-        <p14:creationId xmlns:p14="http://schemas.microsoft.com/office/powerpoint/2010/main" val="1469995211"/>
+        <p14:creationId xmlns:p14="http://schemas.microsoft.com/office/powerpoint/2010/main" val="1370454698"/>
       </p:ext>
     </p:extLst>
   </p:cSld>
@@ -19378,7 +19410,7 @@
           <a:p>
             <a:r>
               <a:rPr lang="en-US" dirty="0" smtClean="0"/>
-              <a:t>Activity 4: design the grid		- Draw!</a:t>
+              <a:t>Activity 4: design the grid		- a pause for time</a:t>
             </a:r>
             <a:endParaRPr lang="en-US" dirty="0"/>
           </a:p>
@@ -19408,19 +19440,33 @@
           <a:p>
             <a:r>
               <a:rPr lang="en-US" sz="2400" dirty="0" smtClean="0"/>
-              <a:t>Draw your grid out on the big sheet.</a:t>
+              <a:t>Consider the meaning of intersections between your time and priorities.  Take a moment to ponder what this means to you.</a:t>
             </a:r>
           </a:p>
           <a:p>
             <a:r>
               <a:rPr lang="en-US" sz="2400" dirty="0" smtClean="0"/>
-              <a:t>Add the number of rows and columns.</a:t>
+              <a:t>Generally: </a:t>
+            </a:r>
+          </a:p>
+          <a:p>
+            <a:pPr lvl="1"/>
+            <a:r>
+              <a:rPr lang="en-US" sz="2200" dirty="0" smtClean="0"/>
+              <a:t>The soonest and highest priority items should be the most specific.</a:t>
+            </a:r>
+          </a:p>
+          <a:p>
+            <a:pPr lvl="1"/>
+            <a:r>
+              <a:rPr lang="en-US" sz="2200" dirty="0" smtClean="0"/>
+              <a:t>The furthest away and lowest priority items can be ambiguous.</a:t>
             </a:r>
           </a:p>
           <a:p>
             <a:r>
               <a:rPr lang="en-US" sz="2400" dirty="0" smtClean="0"/>
-              <a:t>Add the labels and clarifications you chose.</a:t>
+              <a:t>This is a living document that you will need to revisit regularly.  That cycle depends on your needs.</a:t>
             </a:r>
           </a:p>
         </p:txBody>
@@ -19428,7 +19474,7 @@
     </p:spTree>
     <p:extLst>
       <p:ext uri="{BB962C8B-B14F-4D97-AF65-F5344CB8AC3E}">
-        <p14:creationId xmlns:p14="http://schemas.microsoft.com/office/powerpoint/2010/main" val="1557636189"/>
+        <p14:creationId xmlns:p14="http://schemas.microsoft.com/office/powerpoint/2010/main" val="1469995211"/>
       </p:ext>
     </p:extLst>
   </p:cSld>
@@ -19472,7 +19518,7 @@
           <a:p>
             <a:r>
               <a:rPr lang="en-US" dirty="0" smtClean="0"/>
-              <a:t>Activity 5: arrange the players		-Wants</a:t>
+              <a:t>Activity 4: design the grid		- Draw!</a:t>
             </a:r>
             <a:endParaRPr lang="en-US" dirty="0"/>
           </a:p>
@@ -19488,7 +19534,12 @@
             <p:ph idx="1"/>
           </p:nvPr>
         </p:nvSpPr>
-        <p:spPr/>
+        <p:spPr>
+          <a:xfrm>
+            <a:off x="938758" y="2286002"/>
+            <a:ext cx="7633742" cy="4391524"/>
+          </a:xfrm>
+        </p:spPr>
         <p:txBody>
           <a:bodyPr>
             <a:normAutofit/>
@@ -19497,39 +19548,19 @@
           <a:p>
             <a:r>
               <a:rPr lang="en-US" sz="2400" dirty="0" smtClean="0"/>
-              <a:t>We’re going to do </a:t>
-            </a:r>
-            <a:r>
-              <a:rPr lang="en-US" sz="2400" b="1" dirty="0" smtClean="0"/>
-              <a:t>Wants </a:t>
-            </a:r>
+              <a:t>Draw your grid out on the big sheet.</a:t>
+            </a:r>
+          </a:p>
+          <a:p>
             <a:r>
               <a:rPr lang="en-US" sz="2400" dirty="0" smtClean="0"/>
-              <a:t>next.  Use the same steps.</a:t>
+              <a:t>Add the number of rows and columns.</a:t>
             </a:r>
           </a:p>
           <a:p>
             <a:r>
               <a:rPr lang="en-US" sz="2400" dirty="0" smtClean="0"/>
-              <a:t>Pull all of them out into a separate pile.</a:t>
-            </a:r>
-          </a:p>
-          <a:p>
-            <a:r>
-              <a:rPr lang="en-US" sz="2400" dirty="0" smtClean="0"/>
-              <a:t>Arrange any in dependency order.</a:t>
-            </a:r>
-          </a:p>
-          <a:p>
-            <a:r>
-              <a:rPr lang="en-US" sz="2400" dirty="0" smtClean="0"/>
-              <a:t>Do you have any specific deadlines?  If so, write them in on the note.</a:t>
-            </a:r>
-          </a:p>
-          <a:p>
-            <a:r>
-              <a:rPr lang="en-US" sz="2400" dirty="0" smtClean="0"/>
-              <a:t>Start placing them in according to time requirements.</a:t>
+              <a:t>Add the labels and clarifications you chose.</a:t>
             </a:r>
           </a:p>
         </p:txBody>
@@ -19537,7 +19568,7 @@
     </p:spTree>
     <p:extLst>
       <p:ext uri="{BB962C8B-B14F-4D97-AF65-F5344CB8AC3E}">
-        <p14:creationId xmlns:p14="http://schemas.microsoft.com/office/powerpoint/2010/main" val="1365771593"/>
+        <p14:creationId xmlns:p14="http://schemas.microsoft.com/office/powerpoint/2010/main" val="1557636189"/>
       </p:ext>
     </p:extLst>
   </p:cSld>
@@ -19581,7 +19612,7 @@
           <a:p>
             <a:r>
               <a:rPr lang="en-US" dirty="0" smtClean="0"/>
-              <a:t>Activity 5: arrange the players		-Watches</a:t>
+              <a:t>Activity 5: arrange the players		-Wants</a:t>
             </a:r>
             <a:endParaRPr lang="en-US" dirty="0"/>
           </a:p>
@@ -19610,11 +19641,11 @@
             </a:r>
             <a:r>
               <a:rPr lang="en-US" sz="2400" b="1" dirty="0" smtClean="0"/>
-              <a:t>Watches </a:t>
+              <a:t>Wants </a:t>
             </a:r>
             <a:r>
               <a:rPr lang="en-US" sz="2400" dirty="0" smtClean="0"/>
-              <a:t>next. Use the same steps.</a:t>
+              <a:t>next.  Use the same steps.</a:t>
             </a:r>
           </a:p>
           <a:p>
@@ -19646,7 +19677,7 @@
     </p:spTree>
     <p:extLst>
       <p:ext uri="{BB962C8B-B14F-4D97-AF65-F5344CB8AC3E}">
-        <p14:creationId xmlns:p14="http://schemas.microsoft.com/office/powerpoint/2010/main" val="70460768"/>
+        <p14:creationId xmlns:p14="http://schemas.microsoft.com/office/powerpoint/2010/main" val="1365771593"/>
       </p:ext>
     </p:extLst>
   </p:cSld>
@@ -19690,7 +19721,7 @@
           <a:p>
             <a:r>
               <a:rPr lang="en-US" dirty="0" smtClean="0"/>
-              <a:t>Activity 5: arrange the players		-discuss</a:t>
+              <a:t>Activity 5: arrange the players		-Watches</a:t>
             </a:r>
             <a:endParaRPr lang="en-US" dirty="0"/>
           </a:p>
@@ -19715,36 +19746,47 @@
           <a:p>
             <a:r>
               <a:rPr lang="en-US" sz="2400" dirty="0" smtClean="0"/>
-              <a:t>How did that go?</a:t>
-            </a:r>
-          </a:p>
-          <a:p>
+              <a:t>We’re going to do </a:t>
+            </a:r>
+            <a:r>
+              <a:rPr lang="en-US" sz="2400" b="1" dirty="0" smtClean="0"/>
+              <a:t>Watches </a:t>
+            </a:r>
             <a:r>
               <a:rPr lang="en-US" sz="2400" dirty="0" smtClean="0"/>
-              <a:t>What was the easiest part?</a:t>
+              <a:t>next. Use the same steps.</a:t>
             </a:r>
           </a:p>
           <a:p>
             <a:r>
               <a:rPr lang="en-US" sz="2400" dirty="0" smtClean="0"/>
-              <a:t>What was the hardest part?  Or the hardest choice?</a:t>
+              <a:t>Pull all of them out into a separate pile.</a:t>
             </a:r>
           </a:p>
           <a:p>
             <a:r>
               <a:rPr lang="en-US" sz="2400" dirty="0" smtClean="0"/>
-              <a:t>Did you need to change anything?</a:t>
-            </a:r>
-          </a:p>
-          <a:p>
-            <a:endParaRPr lang="en-US" sz="2400" dirty="0" smtClean="0"/>
+              <a:t>Arrange any in dependency order.</a:t>
+            </a:r>
+          </a:p>
+          <a:p>
+            <a:r>
+              <a:rPr lang="en-US" sz="2400" dirty="0" smtClean="0"/>
+              <a:t>Do you have any specific deadlines?  If so, write them in on the note.</a:t>
+            </a:r>
+          </a:p>
+          <a:p>
+            <a:r>
+              <a:rPr lang="en-US" sz="2400" dirty="0" smtClean="0"/>
+              <a:t>Start placing them in according to time requirements.</a:t>
+            </a:r>
           </a:p>
         </p:txBody>
       </p:sp>
     </p:spTree>
     <p:extLst>
       <p:ext uri="{BB962C8B-B14F-4D97-AF65-F5344CB8AC3E}">
-        <p14:creationId xmlns:p14="http://schemas.microsoft.com/office/powerpoint/2010/main" val="970638279"/>
+        <p14:creationId xmlns:p14="http://schemas.microsoft.com/office/powerpoint/2010/main" val="70460768"/>
       </p:ext>
     </p:extLst>
   </p:cSld>
@@ -19788,6 +19830,104 @@
           <a:p>
             <a:r>
               <a:rPr lang="en-US" dirty="0" smtClean="0"/>
+              <a:t>Activity 5: arrange the players		-discuss</a:t>
+            </a:r>
+            <a:endParaRPr lang="en-US" dirty="0"/>
+          </a:p>
+        </p:txBody>
+      </p:sp>
+      <p:sp>
+        <p:nvSpPr>
+          <p:cNvPr id="3" name="Content Placeholder 2"/>
+          <p:cNvSpPr>
+            <a:spLocks noGrp="1"/>
+          </p:cNvSpPr>
+          <p:nvPr>
+            <p:ph idx="1"/>
+          </p:nvPr>
+        </p:nvSpPr>
+        <p:spPr/>
+        <p:txBody>
+          <a:bodyPr>
+            <a:normAutofit/>
+          </a:bodyPr>
+          <a:lstStyle/>
+          <a:p>
+            <a:r>
+              <a:rPr lang="en-US" sz="2400" dirty="0" smtClean="0"/>
+              <a:t>How did that go?</a:t>
+            </a:r>
+          </a:p>
+          <a:p>
+            <a:r>
+              <a:rPr lang="en-US" sz="2400" dirty="0" smtClean="0"/>
+              <a:t>What was the easiest part?</a:t>
+            </a:r>
+          </a:p>
+          <a:p>
+            <a:r>
+              <a:rPr lang="en-US" sz="2400" dirty="0" smtClean="0"/>
+              <a:t>What was the hardest part?  Or the hardest choice?</a:t>
+            </a:r>
+          </a:p>
+          <a:p>
+            <a:r>
+              <a:rPr lang="en-US" sz="2400" dirty="0" smtClean="0"/>
+              <a:t>Did you need to change anything?</a:t>
+            </a:r>
+          </a:p>
+          <a:p>
+            <a:endParaRPr lang="en-US" sz="2400" dirty="0" smtClean="0"/>
+          </a:p>
+        </p:txBody>
+      </p:sp>
+    </p:spTree>
+    <p:extLst>
+      <p:ext uri="{BB962C8B-B14F-4D97-AF65-F5344CB8AC3E}">
+        <p14:creationId xmlns:p14="http://schemas.microsoft.com/office/powerpoint/2010/main" val="970638279"/>
+      </p:ext>
+    </p:extLst>
+  </p:cSld>
+  <p:clrMapOvr>
+    <a:masterClrMapping/>
+  </p:clrMapOvr>
+</p:sld>
+</file>
+
+<file path=ppt/slides/slide56.xml><?xml version="1.0" encoding="utf-8"?>
+<p:sld xmlns:a="http://schemas.openxmlformats.org/drawingml/2006/main" xmlns:r="http://schemas.openxmlformats.org/officeDocument/2006/relationships" xmlns:p="http://schemas.openxmlformats.org/presentationml/2006/main">
+  <p:cSld>
+    <p:spTree>
+      <p:nvGrpSpPr>
+        <p:cNvPr id="1" name=""/>
+        <p:cNvGrpSpPr/>
+        <p:nvPr/>
+      </p:nvGrpSpPr>
+      <p:grpSpPr>
+        <a:xfrm>
+          <a:off x="0" y="0"/>
+          <a:ext cx="0" cy="0"/>
+          <a:chOff x="0" y="0"/>
+          <a:chExt cx="0" cy="0"/>
+        </a:xfrm>
+      </p:grpSpPr>
+      <p:sp>
+        <p:nvSpPr>
+          <p:cNvPr id="2" name="Title 1"/>
+          <p:cNvSpPr>
+            <a:spLocks noGrp="1"/>
+          </p:cNvSpPr>
+          <p:nvPr>
+            <p:ph type="title"/>
+          </p:nvPr>
+        </p:nvSpPr>
+        <p:spPr/>
+        <p:txBody>
+          <a:bodyPr/>
+          <a:lstStyle/>
+          <a:p>
+            <a:r>
+              <a:rPr lang="en-US" dirty="0" smtClean="0"/>
               <a:t>Activity 5: arrange the players		-review</a:t>
             </a:r>
             <a:endParaRPr lang="en-US" dirty="0"/>
@@ -19843,7 +19983,7 @@
 </p:sld>
 </file>
 
-<file path=ppt/slides/slide56.xml><?xml version="1.0" encoding="utf-8"?>
+<file path=ppt/slides/slide57.xml><?xml version="1.0" encoding="utf-8"?>
 <p:sld xmlns:a="http://schemas.openxmlformats.org/drawingml/2006/main" xmlns:r="http://schemas.openxmlformats.org/officeDocument/2006/relationships" xmlns:p="http://schemas.openxmlformats.org/presentationml/2006/main">
   <p:cSld>
     <p:spTree>
@@ -20022,6 +20162,13 @@
   <p:clrMapOvr>
     <a:masterClrMapping/>
   </p:clrMapOvr>
+  <p:timing>
+    <p:tnLst>
+      <p:par>
+        <p:cTn id="1" dur="indefinite" restart="never" nodeType="tmRoot"/>
+      </p:par>
+    </p:tnLst>
+  </p:timing>
 </p:sld>
 </file>
 
@@ -20148,6 +20295,13 @@
   <p:clrMapOvr>
     <a:masterClrMapping/>
   </p:clrMapOvr>
+  <p:timing>
+    <p:tnLst>
+      <p:par>
+        <p:cTn id="1" dur="indefinite" restart="never" nodeType="tmRoot"/>
+      </p:par>
+    </p:tnLst>
+  </p:timing>
 </p:sld>
 </file>
 
@@ -20220,6 +20374,13 @@
   <p:clrMapOvr>
     <a:masterClrMapping/>
   </p:clrMapOvr>
+  <p:timing>
+    <p:tnLst>
+      <p:par>
+        <p:cTn id="1" dur="indefinite" restart="never" nodeType="tmRoot"/>
+      </p:par>
+    </p:tnLst>
+  </p:timing>
 </p:sld>
 </file>
 
@@ -20352,6 +20513,13 @@
   <p:clrMapOvr>
     <a:masterClrMapping/>
   </p:clrMapOvr>
+  <p:timing>
+    <p:tnLst>
+      <p:par>
+        <p:cTn id="1" dur="indefinite" restart="never" nodeType="tmRoot"/>
+      </p:par>
+    </p:tnLst>
+  </p:timing>
 </p:sld>
 </file>
 

</xml_diff>